<commit_message>
Update to version 7.2 plus add distance_feature
Also updated the power point to cover cluster.initial_master_nodes instead of min_master_nodes.
</commit_message>
<xml_diff>
--- a/ElasticsearchOps.pptx
+++ b/ElasticsearchOps.pptx
@@ -225,7 +225,7 @@
           <a:p>
             <a:fld id="{B0160BEC-550A-4FF5-8A23-3504083A2721}" type="datetimeFigureOut">
               <a:rPr lang="en-US" smtClean="0"/>
-              <a:t>10/11/18</a:t>
+              <a:t>6/30/19</a:t>
             </a:fld>
             <a:endParaRPr lang="en-US" dirty="0"/>
           </a:p>
@@ -5842,16 +5842,18 @@
           <a:p>
             <a:r>
               <a:rPr lang="en-US" dirty="0" err="1"/>
-              <a:t>discovery.zen.minimum_master_nodes</a:t>
-            </a:r>
-            <a:endParaRPr lang="en-US" dirty="0"/>
-          </a:p>
-          <a:p>
-            <a:r>
-              <a:rPr lang="en-US"/>
+              <a:t>cluster.initial_master_nodes</a:t>
+            </a:r>
+            <a:r>
+              <a:rPr lang="en-US" dirty="0"/>
+              <a:t> (version 7+)</a:t>
+            </a:r>
+          </a:p>
+          <a:p>
+            <a:r>
+              <a:rPr lang="en-US" dirty="0"/>
               <a:t>….</a:t>
             </a:r>
-            <a:endParaRPr lang="en-US" dirty="0"/>
           </a:p>
         </p:txBody>
       </p:sp>

</xml_diff>

<commit_message>
Add sizing section to power-point.
Wish I had used some sort of Markdown thing instead.
</commit_message>
<xml_diff>
--- a/ElasticsearchOps.pptx
+++ b/ElasticsearchOps.pptx
@@ -5,7 +5,7 @@
     <p:sldMasterId id="2147483648" r:id="rId1"/>
   </p:sldMasterIdLst>
   <p:notesMasterIdLst>
-    <p:notesMasterId r:id="rId20"/>
+    <p:notesMasterId r:id="rId24"/>
   </p:notesMasterIdLst>
   <p:sldIdLst>
     <p:sldId id="256" r:id="rId2"/>
@@ -20,12 +20,16 @@
     <p:sldId id="284" r:id="rId11"/>
     <p:sldId id="283" r:id="rId12"/>
     <p:sldId id="278" r:id="rId13"/>
-    <p:sldId id="287" r:id="rId14"/>
-    <p:sldId id="288" r:id="rId15"/>
-    <p:sldId id="289" r:id="rId16"/>
-    <p:sldId id="290" r:id="rId17"/>
-    <p:sldId id="292" r:id="rId18"/>
-    <p:sldId id="293" r:id="rId19"/>
+    <p:sldId id="297" r:id="rId14"/>
+    <p:sldId id="298" r:id="rId15"/>
+    <p:sldId id="299" r:id="rId16"/>
+    <p:sldId id="300" r:id="rId17"/>
+    <p:sldId id="287" r:id="rId18"/>
+    <p:sldId id="288" r:id="rId19"/>
+    <p:sldId id="289" r:id="rId20"/>
+    <p:sldId id="290" r:id="rId21"/>
+    <p:sldId id="292" r:id="rId22"/>
+    <p:sldId id="293" r:id="rId23"/>
   </p:sldIdLst>
   <p:sldSz cx="9144000" cy="5143500" type="screen16x9"/>
   <p:notesSz cx="6858000" cy="9144000"/>
@@ -725,7 +729,7 @@
           <a:p>
             <a:fld id="{FF51CD68-44D3-4681-9782-B8CA0706D3C3}" type="slidenum">
               <a:rPr lang="en-US" smtClean="0"/>
-              <a:t>17</a:t>
+              <a:t>21</a:t>
             </a:fld>
             <a:endParaRPr lang="en-US" dirty="0"/>
           </a:p>
@@ -809,7 +813,7 @@
           <a:p>
             <a:fld id="{FF51CD68-44D3-4681-9782-B8CA0706D3C3}" type="slidenum">
               <a:rPr lang="en-US" smtClean="0"/>
-              <a:t>18</a:t>
+              <a:t>22</a:t>
             </a:fld>
             <a:endParaRPr lang="en-US" dirty="0"/>
           </a:p>
@@ -5657,6 +5661,1297 @@
       </p:grpSpPr>
       <p:sp>
         <p:nvSpPr>
+          <p:cNvPr id="2" name="Title 1">
+            <a:extLst>
+              <a:ext uri="{FF2B5EF4-FFF2-40B4-BE49-F238E27FC236}">
+                <a16:creationId xmlns:a16="http://schemas.microsoft.com/office/drawing/2014/main" id="{03F1C004-6442-7146-B473-03B024DC0060}"/>
+              </a:ext>
+            </a:extLst>
+          </p:cNvPr>
+          <p:cNvSpPr>
+            <a:spLocks noGrp="1"/>
+          </p:cNvSpPr>
+          <p:nvPr>
+            <p:ph type="title"/>
+          </p:nvPr>
+        </p:nvSpPr>
+        <p:spPr/>
+        <p:txBody>
+          <a:bodyPr/>
+          <a:lstStyle/>
+          <a:p>
+            <a:pPr algn="ctr"/>
+            <a:r>
+              <a:rPr lang="en-US" dirty="0"/>
+              <a:t>Sizing</a:t>
+            </a:r>
+          </a:p>
+        </p:txBody>
+      </p:sp>
+    </p:spTree>
+    <p:extLst>
+      <p:ext uri="{BB962C8B-B14F-4D97-AF65-F5344CB8AC3E}">
+        <p14:creationId xmlns:p14="http://schemas.microsoft.com/office/powerpoint/2010/main" val="2070256386"/>
+      </p:ext>
+    </p:extLst>
+  </p:cSld>
+  <p:clrMapOvr>
+    <a:masterClrMapping/>
+  </p:clrMapOvr>
+</p:sld>
+</file>
+
+<file path=ppt/slides/slide14.xml><?xml version="1.0" encoding="utf-8"?>
+<p:sld xmlns:a="http://schemas.openxmlformats.org/drawingml/2006/main" xmlns:r="http://schemas.openxmlformats.org/officeDocument/2006/relationships" xmlns:p="http://schemas.openxmlformats.org/presentationml/2006/main">
+  <p:cSld>
+    <p:spTree>
+      <p:nvGrpSpPr>
+        <p:cNvPr id="1" name=""/>
+        <p:cNvGrpSpPr/>
+        <p:nvPr/>
+      </p:nvGrpSpPr>
+      <p:grpSpPr>
+        <a:xfrm>
+          <a:off x="0" y="0"/>
+          <a:ext cx="0" cy="0"/>
+          <a:chOff x="0" y="0"/>
+          <a:chExt cx="0" cy="0"/>
+        </a:xfrm>
+      </p:grpSpPr>
+      <p:sp>
+        <p:nvSpPr>
+          <p:cNvPr id="2" name="Title 1"/>
+          <p:cNvSpPr>
+            <a:spLocks noGrp="1"/>
+          </p:cNvSpPr>
+          <p:nvPr>
+            <p:ph type="title"/>
+          </p:nvPr>
+        </p:nvSpPr>
+        <p:spPr/>
+        <p:txBody>
+          <a:bodyPr/>
+          <a:lstStyle/>
+          <a:p>
+            <a:r>
+              <a:rPr lang="en-US" dirty="0"/>
+              <a:t>Sizing your cluster</a:t>
+            </a:r>
+          </a:p>
+        </p:txBody>
+      </p:sp>
+      <p:sp>
+        <p:nvSpPr>
+          <p:cNvPr id="3" name="Content Placeholder 2"/>
+          <p:cNvSpPr>
+            <a:spLocks noGrp="1"/>
+          </p:cNvSpPr>
+          <p:nvPr>
+            <p:ph idx="1"/>
+          </p:nvPr>
+        </p:nvSpPr>
+        <p:spPr>
+          <a:xfrm>
+            <a:off x="457200" y="819150"/>
+            <a:ext cx="8229600" cy="4038600"/>
+          </a:xfrm>
+        </p:spPr>
+        <p:txBody>
+          <a:bodyPr>
+            <a:normAutofit/>
+          </a:bodyPr>
+          <a:lstStyle/>
+          <a:p>
+            <a:pPr marL="0" indent="0">
+              <a:buNone/>
+            </a:pPr>
+            <a:r>
+              <a:rPr lang="en-US" dirty="0"/>
+              <a:t>Recommendations:</a:t>
+            </a:r>
+          </a:p>
+          <a:p>
+            <a:r>
+              <a:rPr lang="en-US" dirty="0"/>
+              <a:t>Limit JVM Heap:</a:t>
+            </a:r>
+          </a:p>
+          <a:p>
+            <a:pPr lvl="1"/>
+            <a:r>
+              <a:rPr lang="en-US" dirty="0"/>
+              <a:t>No more than 30Gb</a:t>
+            </a:r>
+          </a:p>
+          <a:p>
+            <a:pPr lvl="1"/>
+            <a:r>
+              <a:rPr lang="en-US" dirty="0"/>
+              <a:t>No more than 50% of available RAM</a:t>
+            </a:r>
+          </a:p>
+          <a:p>
+            <a:r>
+              <a:rPr lang="en-US" dirty="0"/>
+              <a:t>Typical: 8 to 16 cores with 64Gb RAM</a:t>
+            </a:r>
+          </a:p>
+          <a:p>
+            <a:r>
+              <a:rPr lang="en-US" dirty="0"/>
+              <a:t>3 master nodes &amp; at least 3 data nodes</a:t>
+            </a:r>
+          </a:p>
+          <a:p>
+            <a:r>
+              <a:rPr lang="en-US" dirty="0"/>
+              <a:t>Master nodes can be small (e.g. 8Gb)</a:t>
+            </a:r>
+          </a:p>
+          <a:p>
+            <a:endParaRPr lang="en-US" dirty="0"/>
+          </a:p>
+        </p:txBody>
+      </p:sp>
+      <p:sp>
+        <p:nvSpPr>
+          <p:cNvPr id="4" name="TextBox 3">
+            <a:extLst>
+              <a:ext uri="{FF2B5EF4-FFF2-40B4-BE49-F238E27FC236}">
+                <a16:creationId xmlns:a16="http://schemas.microsoft.com/office/drawing/2014/main" id="{2F06FA5D-F37F-834C-B309-3957287EA547}"/>
+              </a:ext>
+            </a:extLst>
+          </p:cNvPr>
+          <p:cNvSpPr txBox="1"/>
+          <p:nvPr/>
+        </p:nvSpPr>
+        <p:spPr>
+          <a:xfrm>
+            <a:off x="6873871" y="4705350"/>
+            <a:ext cx="2101857" cy="276999"/>
+          </a:xfrm>
+          <a:prstGeom prst="rect">
+            <a:avLst/>
+          </a:prstGeom>
+          <a:noFill/>
+        </p:spPr>
+        <p:txBody>
+          <a:bodyPr wrap="none" rtlCol="0">
+            <a:spAutoFit/>
+          </a:bodyPr>
+          <a:lstStyle/>
+          <a:p>
+            <a:r>
+              <a:rPr lang="en-AU" sz="1200" dirty="0">
+                <a:solidFill>
+                  <a:schemeClr val="bg1">
+                    <a:lumMod val="75000"/>
+                  </a:schemeClr>
+                </a:solidFill>
+              </a:rPr>
+              <a:t>© copyright REA Group Ltd</a:t>
+            </a:r>
+            <a:endParaRPr lang="en-US" sz="1200" dirty="0">
+              <a:solidFill>
+                <a:schemeClr val="bg1">
+                  <a:lumMod val="75000"/>
+                </a:schemeClr>
+              </a:solidFill>
+            </a:endParaRPr>
+          </a:p>
+        </p:txBody>
+      </p:sp>
+    </p:spTree>
+    <p:extLst>
+      <p:ext uri="{BB962C8B-B14F-4D97-AF65-F5344CB8AC3E}">
+        <p14:creationId xmlns:p14="http://schemas.microsoft.com/office/powerpoint/2010/main" val="2530165087"/>
+      </p:ext>
+    </p:extLst>
+  </p:cSld>
+  <p:clrMapOvr>
+    <a:masterClrMapping/>
+  </p:clrMapOvr>
+  <p:timing>
+    <p:tnLst>
+      <p:par>
+        <p:cTn id="1" dur="indefinite" restart="never" nodeType="tmRoot">
+          <p:childTnLst>
+            <p:seq concurrent="1" nextAc="seek">
+              <p:cTn id="2" dur="indefinite" nodeType="mainSeq">
+                <p:childTnLst>
+                  <p:par>
+                    <p:cTn id="3" fill="hold">
+                      <p:stCondLst>
+                        <p:cond delay="indefinite"/>
+                      </p:stCondLst>
+                      <p:childTnLst>
+                        <p:par>
+                          <p:cTn id="4" fill="hold">
+                            <p:stCondLst>
+                              <p:cond delay="0"/>
+                            </p:stCondLst>
+                            <p:childTnLst>
+                              <p:par>
+                                <p:cTn id="5" presetID="1" presetClass="entr" presetSubtype="0" fill="hold" grpId="0" nodeType="clickEffect">
+                                  <p:stCondLst>
+                                    <p:cond delay="0"/>
+                                  </p:stCondLst>
+                                  <p:childTnLst>
+                                    <p:set>
+                                      <p:cBhvr>
+                                        <p:cTn id="6" dur="1" fill="hold">
+                                          <p:stCondLst>
+                                            <p:cond delay="0"/>
+                                          </p:stCondLst>
+                                        </p:cTn>
+                                        <p:tgtEl>
+                                          <p:spTgt spid="3">
+                                            <p:txEl>
+                                              <p:pRg st="0" end="0"/>
+                                            </p:txEl>
+                                          </p:spTgt>
+                                        </p:tgtEl>
+                                        <p:attrNameLst>
+                                          <p:attrName>style.visibility</p:attrName>
+                                        </p:attrNameLst>
+                                      </p:cBhvr>
+                                      <p:to>
+                                        <p:strVal val="visible"/>
+                                      </p:to>
+                                    </p:set>
+                                  </p:childTnLst>
+                                </p:cTn>
+                              </p:par>
+                            </p:childTnLst>
+                          </p:cTn>
+                        </p:par>
+                      </p:childTnLst>
+                    </p:cTn>
+                  </p:par>
+                  <p:par>
+                    <p:cTn id="7" fill="hold">
+                      <p:stCondLst>
+                        <p:cond delay="indefinite"/>
+                      </p:stCondLst>
+                      <p:childTnLst>
+                        <p:par>
+                          <p:cTn id="8" fill="hold">
+                            <p:stCondLst>
+                              <p:cond delay="0"/>
+                            </p:stCondLst>
+                            <p:childTnLst>
+                              <p:par>
+                                <p:cTn id="9" presetID="1" presetClass="entr" presetSubtype="0" fill="hold" grpId="0" nodeType="clickEffect">
+                                  <p:stCondLst>
+                                    <p:cond delay="0"/>
+                                  </p:stCondLst>
+                                  <p:childTnLst>
+                                    <p:set>
+                                      <p:cBhvr>
+                                        <p:cTn id="10" dur="1" fill="hold">
+                                          <p:stCondLst>
+                                            <p:cond delay="0"/>
+                                          </p:stCondLst>
+                                        </p:cTn>
+                                        <p:tgtEl>
+                                          <p:spTgt spid="3">
+                                            <p:txEl>
+                                              <p:pRg st="1" end="1"/>
+                                            </p:txEl>
+                                          </p:spTgt>
+                                        </p:tgtEl>
+                                        <p:attrNameLst>
+                                          <p:attrName>style.visibility</p:attrName>
+                                        </p:attrNameLst>
+                                      </p:cBhvr>
+                                      <p:to>
+                                        <p:strVal val="visible"/>
+                                      </p:to>
+                                    </p:set>
+                                  </p:childTnLst>
+                                </p:cTn>
+                              </p:par>
+                              <p:par>
+                                <p:cTn id="11" presetID="1" presetClass="entr" presetSubtype="0" fill="hold" grpId="0" nodeType="withEffect">
+                                  <p:stCondLst>
+                                    <p:cond delay="0"/>
+                                  </p:stCondLst>
+                                  <p:childTnLst>
+                                    <p:set>
+                                      <p:cBhvr>
+                                        <p:cTn id="12" dur="1" fill="hold">
+                                          <p:stCondLst>
+                                            <p:cond delay="0"/>
+                                          </p:stCondLst>
+                                        </p:cTn>
+                                        <p:tgtEl>
+                                          <p:spTgt spid="3">
+                                            <p:txEl>
+                                              <p:pRg st="2" end="2"/>
+                                            </p:txEl>
+                                          </p:spTgt>
+                                        </p:tgtEl>
+                                        <p:attrNameLst>
+                                          <p:attrName>style.visibility</p:attrName>
+                                        </p:attrNameLst>
+                                      </p:cBhvr>
+                                      <p:to>
+                                        <p:strVal val="visible"/>
+                                      </p:to>
+                                    </p:set>
+                                  </p:childTnLst>
+                                </p:cTn>
+                              </p:par>
+                              <p:par>
+                                <p:cTn id="13" presetID="1" presetClass="entr" presetSubtype="0" fill="hold" grpId="0" nodeType="withEffect">
+                                  <p:stCondLst>
+                                    <p:cond delay="0"/>
+                                  </p:stCondLst>
+                                  <p:childTnLst>
+                                    <p:set>
+                                      <p:cBhvr>
+                                        <p:cTn id="14" dur="1" fill="hold">
+                                          <p:stCondLst>
+                                            <p:cond delay="0"/>
+                                          </p:stCondLst>
+                                        </p:cTn>
+                                        <p:tgtEl>
+                                          <p:spTgt spid="3">
+                                            <p:txEl>
+                                              <p:pRg st="3" end="3"/>
+                                            </p:txEl>
+                                          </p:spTgt>
+                                        </p:tgtEl>
+                                        <p:attrNameLst>
+                                          <p:attrName>style.visibility</p:attrName>
+                                        </p:attrNameLst>
+                                      </p:cBhvr>
+                                      <p:to>
+                                        <p:strVal val="visible"/>
+                                      </p:to>
+                                    </p:set>
+                                  </p:childTnLst>
+                                </p:cTn>
+                              </p:par>
+                            </p:childTnLst>
+                          </p:cTn>
+                        </p:par>
+                      </p:childTnLst>
+                    </p:cTn>
+                  </p:par>
+                  <p:par>
+                    <p:cTn id="15" fill="hold">
+                      <p:stCondLst>
+                        <p:cond delay="indefinite"/>
+                      </p:stCondLst>
+                      <p:childTnLst>
+                        <p:par>
+                          <p:cTn id="16" fill="hold">
+                            <p:stCondLst>
+                              <p:cond delay="0"/>
+                            </p:stCondLst>
+                            <p:childTnLst>
+                              <p:par>
+                                <p:cTn id="17" presetID="1" presetClass="entr" presetSubtype="0" fill="hold" grpId="0" nodeType="clickEffect">
+                                  <p:stCondLst>
+                                    <p:cond delay="0"/>
+                                  </p:stCondLst>
+                                  <p:childTnLst>
+                                    <p:set>
+                                      <p:cBhvr>
+                                        <p:cTn id="18" dur="1" fill="hold">
+                                          <p:stCondLst>
+                                            <p:cond delay="0"/>
+                                          </p:stCondLst>
+                                        </p:cTn>
+                                        <p:tgtEl>
+                                          <p:spTgt spid="3">
+                                            <p:txEl>
+                                              <p:pRg st="4" end="4"/>
+                                            </p:txEl>
+                                          </p:spTgt>
+                                        </p:tgtEl>
+                                        <p:attrNameLst>
+                                          <p:attrName>style.visibility</p:attrName>
+                                        </p:attrNameLst>
+                                      </p:cBhvr>
+                                      <p:to>
+                                        <p:strVal val="visible"/>
+                                      </p:to>
+                                    </p:set>
+                                  </p:childTnLst>
+                                </p:cTn>
+                              </p:par>
+                            </p:childTnLst>
+                          </p:cTn>
+                        </p:par>
+                      </p:childTnLst>
+                    </p:cTn>
+                  </p:par>
+                  <p:par>
+                    <p:cTn id="19" fill="hold">
+                      <p:stCondLst>
+                        <p:cond delay="indefinite"/>
+                      </p:stCondLst>
+                      <p:childTnLst>
+                        <p:par>
+                          <p:cTn id="20" fill="hold">
+                            <p:stCondLst>
+                              <p:cond delay="0"/>
+                            </p:stCondLst>
+                            <p:childTnLst>
+                              <p:par>
+                                <p:cTn id="21" presetID="1" presetClass="entr" presetSubtype="0" fill="hold" grpId="0" nodeType="clickEffect">
+                                  <p:stCondLst>
+                                    <p:cond delay="0"/>
+                                  </p:stCondLst>
+                                  <p:childTnLst>
+                                    <p:set>
+                                      <p:cBhvr>
+                                        <p:cTn id="22" dur="1" fill="hold">
+                                          <p:stCondLst>
+                                            <p:cond delay="0"/>
+                                          </p:stCondLst>
+                                        </p:cTn>
+                                        <p:tgtEl>
+                                          <p:spTgt spid="3">
+                                            <p:txEl>
+                                              <p:pRg st="5" end="5"/>
+                                            </p:txEl>
+                                          </p:spTgt>
+                                        </p:tgtEl>
+                                        <p:attrNameLst>
+                                          <p:attrName>style.visibility</p:attrName>
+                                        </p:attrNameLst>
+                                      </p:cBhvr>
+                                      <p:to>
+                                        <p:strVal val="visible"/>
+                                      </p:to>
+                                    </p:set>
+                                  </p:childTnLst>
+                                </p:cTn>
+                              </p:par>
+                            </p:childTnLst>
+                          </p:cTn>
+                        </p:par>
+                      </p:childTnLst>
+                    </p:cTn>
+                  </p:par>
+                  <p:par>
+                    <p:cTn id="23" fill="hold">
+                      <p:stCondLst>
+                        <p:cond delay="indefinite"/>
+                      </p:stCondLst>
+                      <p:childTnLst>
+                        <p:par>
+                          <p:cTn id="24" fill="hold">
+                            <p:stCondLst>
+                              <p:cond delay="0"/>
+                            </p:stCondLst>
+                            <p:childTnLst>
+                              <p:par>
+                                <p:cTn id="25" presetID="1" presetClass="entr" presetSubtype="0" fill="hold" grpId="0" nodeType="clickEffect">
+                                  <p:stCondLst>
+                                    <p:cond delay="0"/>
+                                  </p:stCondLst>
+                                  <p:childTnLst>
+                                    <p:set>
+                                      <p:cBhvr>
+                                        <p:cTn id="26" dur="1" fill="hold">
+                                          <p:stCondLst>
+                                            <p:cond delay="0"/>
+                                          </p:stCondLst>
+                                        </p:cTn>
+                                        <p:tgtEl>
+                                          <p:spTgt spid="3">
+                                            <p:txEl>
+                                              <p:pRg st="6" end="6"/>
+                                            </p:txEl>
+                                          </p:spTgt>
+                                        </p:tgtEl>
+                                        <p:attrNameLst>
+                                          <p:attrName>style.visibility</p:attrName>
+                                        </p:attrNameLst>
+                                      </p:cBhvr>
+                                      <p:to>
+                                        <p:strVal val="visible"/>
+                                      </p:to>
+                                    </p:set>
+                                  </p:childTnLst>
+                                </p:cTn>
+                              </p:par>
+                            </p:childTnLst>
+                          </p:cTn>
+                        </p:par>
+                      </p:childTnLst>
+                    </p:cTn>
+                  </p:par>
+                </p:childTnLst>
+              </p:cTn>
+              <p:prevCondLst>
+                <p:cond evt="onPrev" delay="0">
+                  <p:tgtEl>
+                    <p:sldTgt/>
+                  </p:tgtEl>
+                </p:cond>
+              </p:prevCondLst>
+              <p:nextCondLst>
+                <p:cond evt="onNext" delay="0">
+                  <p:tgtEl>
+                    <p:sldTgt/>
+                  </p:tgtEl>
+                </p:cond>
+              </p:nextCondLst>
+            </p:seq>
+          </p:childTnLst>
+        </p:cTn>
+      </p:par>
+    </p:tnLst>
+    <p:bldLst>
+      <p:bldP spid="3" grpId="0" build="p"/>
+    </p:bldLst>
+  </p:timing>
+</p:sld>
+</file>
+
+<file path=ppt/slides/slide15.xml><?xml version="1.0" encoding="utf-8"?>
+<p:sld xmlns:a="http://schemas.openxmlformats.org/drawingml/2006/main" xmlns:r="http://schemas.openxmlformats.org/officeDocument/2006/relationships" xmlns:p="http://schemas.openxmlformats.org/presentationml/2006/main">
+  <p:cSld>
+    <p:spTree>
+      <p:nvGrpSpPr>
+        <p:cNvPr id="1" name=""/>
+        <p:cNvGrpSpPr/>
+        <p:nvPr/>
+      </p:nvGrpSpPr>
+      <p:grpSpPr>
+        <a:xfrm>
+          <a:off x="0" y="0"/>
+          <a:ext cx="0" cy="0"/>
+          <a:chOff x="0" y="0"/>
+          <a:chExt cx="0" cy="0"/>
+        </a:xfrm>
+      </p:grpSpPr>
+      <p:sp>
+        <p:nvSpPr>
+          <p:cNvPr id="2" name="Title 1"/>
+          <p:cNvSpPr>
+            <a:spLocks noGrp="1"/>
+          </p:cNvSpPr>
+          <p:nvPr>
+            <p:ph type="title"/>
+          </p:nvPr>
+        </p:nvSpPr>
+        <p:spPr/>
+        <p:txBody>
+          <a:bodyPr/>
+          <a:lstStyle/>
+          <a:p>
+            <a:r>
+              <a:rPr lang="en-US" dirty="0"/>
+              <a:t>Sizing your cluster</a:t>
+            </a:r>
+          </a:p>
+        </p:txBody>
+      </p:sp>
+      <p:sp>
+        <p:nvSpPr>
+          <p:cNvPr id="3" name="Content Placeholder 2"/>
+          <p:cNvSpPr>
+            <a:spLocks noGrp="1"/>
+          </p:cNvSpPr>
+          <p:nvPr>
+            <p:ph idx="1"/>
+          </p:nvPr>
+        </p:nvSpPr>
+        <p:spPr>
+          <a:xfrm>
+            <a:off x="457200" y="1200151"/>
+            <a:ext cx="8229600" cy="3394472"/>
+          </a:xfrm>
+        </p:spPr>
+        <p:txBody>
+          <a:bodyPr>
+            <a:normAutofit/>
+          </a:bodyPr>
+          <a:lstStyle/>
+          <a:p>
+            <a:pPr marL="0" indent="0">
+              <a:buNone/>
+            </a:pPr>
+            <a:r>
+              <a:rPr lang="en-US" dirty="0" err="1"/>
+              <a:t>Sharding</a:t>
+            </a:r>
+            <a:r>
+              <a:rPr lang="en-US" dirty="0"/>
+              <a:t> Recommendations:</a:t>
+            </a:r>
+          </a:p>
+          <a:p>
+            <a:r>
+              <a:rPr lang="en-US" dirty="0"/>
+              <a:t>Max of 20 shards per Gb of JVM Heap</a:t>
+            </a:r>
+          </a:p>
+          <a:p>
+            <a:r>
+              <a:rPr lang="en-US" dirty="0"/>
+              <a:t>Max of 40Gb per shard</a:t>
+            </a:r>
+          </a:p>
+          <a:p>
+            <a:endParaRPr lang="en-US" dirty="0"/>
+          </a:p>
+        </p:txBody>
+      </p:sp>
+      <p:sp>
+        <p:nvSpPr>
+          <p:cNvPr id="4" name="TextBox 3">
+            <a:extLst>
+              <a:ext uri="{FF2B5EF4-FFF2-40B4-BE49-F238E27FC236}">
+                <a16:creationId xmlns:a16="http://schemas.microsoft.com/office/drawing/2014/main" id="{2F06FA5D-F37F-834C-B309-3957287EA547}"/>
+              </a:ext>
+            </a:extLst>
+          </p:cNvPr>
+          <p:cNvSpPr txBox="1"/>
+          <p:nvPr/>
+        </p:nvSpPr>
+        <p:spPr>
+          <a:xfrm>
+            <a:off x="6873871" y="4705350"/>
+            <a:ext cx="2101857" cy="276999"/>
+          </a:xfrm>
+          <a:prstGeom prst="rect">
+            <a:avLst/>
+          </a:prstGeom>
+          <a:noFill/>
+        </p:spPr>
+        <p:txBody>
+          <a:bodyPr wrap="none" rtlCol="0">
+            <a:spAutoFit/>
+          </a:bodyPr>
+          <a:lstStyle/>
+          <a:p>
+            <a:r>
+              <a:rPr lang="en-AU" sz="1200" dirty="0">
+                <a:solidFill>
+                  <a:schemeClr val="bg1">
+                    <a:lumMod val="75000"/>
+                  </a:schemeClr>
+                </a:solidFill>
+              </a:rPr>
+              <a:t>© copyright REA Group Ltd</a:t>
+            </a:r>
+            <a:endParaRPr lang="en-US" sz="1200" dirty="0">
+              <a:solidFill>
+                <a:schemeClr val="bg1">
+                  <a:lumMod val="75000"/>
+                </a:schemeClr>
+              </a:solidFill>
+            </a:endParaRPr>
+          </a:p>
+        </p:txBody>
+      </p:sp>
+    </p:spTree>
+    <p:extLst>
+      <p:ext uri="{BB962C8B-B14F-4D97-AF65-F5344CB8AC3E}">
+        <p14:creationId xmlns:p14="http://schemas.microsoft.com/office/powerpoint/2010/main" val="2558178727"/>
+      </p:ext>
+    </p:extLst>
+  </p:cSld>
+  <p:clrMapOvr>
+    <a:masterClrMapping/>
+  </p:clrMapOvr>
+  <p:timing>
+    <p:tnLst>
+      <p:par>
+        <p:cTn id="1" dur="indefinite" restart="never" nodeType="tmRoot">
+          <p:childTnLst>
+            <p:seq concurrent="1" nextAc="seek">
+              <p:cTn id="2" dur="indefinite" nodeType="mainSeq">
+                <p:childTnLst>
+                  <p:par>
+                    <p:cTn id="3" fill="hold">
+                      <p:stCondLst>
+                        <p:cond delay="indefinite"/>
+                      </p:stCondLst>
+                      <p:childTnLst>
+                        <p:par>
+                          <p:cTn id="4" fill="hold">
+                            <p:stCondLst>
+                              <p:cond delay="0"/>
+                            </p:stCondLst>
+                            <p:childTnLst>
+                              <p:par>
+                                <p:cTn id="5" presetID="1" presetClass="entr" presetSubtype="0" fill="hold" grpId="0" nodeType="clickEffect">
+                                  <p:stCondLst>
+                                    <p:cond delay="0"/>
+                                  </p:stCondLst>
+                                  <p:childTnLst>
+                                    <p:set>
+                                      <p:cBhvr>
+                                        <p:cTn id="6" dur="1" fill="hold">
+                                          <p:stCondLst>
+                                            <p:cond delay="0"/>
+                                          </p:stCondLst>
+                                        </p:cTn>
+                                        <p:tgtEl>
+                                          <p:spTgt spid="3">
+                                            <p:txEl>
+                                              <p:pRg st="0" end="0"/>
+                                            </p:txEl>
+                                          </p:spTgt>
+                                        </p:tgtEl>
+                                        <p:attrNameLst>
+                                          <p:attrName>style.visibility</p:attrName>
+                                        </p:attrNameLst>
+                                      </p:cBhvr>
+                                      <p:to>
+                                        <p:strVal val="visible"/>
+                                      </p:to>
+                                    </p:set>
+                                  </p:childTnLst>
+                                </p:cTn>
+                              </p:par>
+                            </p:childTnLst>
+                          </p:cTn>
+                        </p:par>
+                      </p:childTnLst>
+                    </p:cTn>
+                  </p:par>
+                  <p:par>
+                    <p:cTn id="7" fill="hold">
+                      <p:stCondLst>
+                        <p:cond delay="indefinite"/>
+                      </p:stCondLst>
+                      <p:childTnLst>
+                        <p:par>
+                          <p:cTn id="8" fill="hold">
+                            <p:stCondLst>
+                              <p:cond delay="0"/>
+                            </p:stCondLst>
+                            <p:childTnLst>
+                              <p:par>
+                                <p:cTn id="9" presetID="1" presetClass="entr" presetSubtype="0" fill="hold" grpId="0" nodeType="clickEffect">
+                                  <p:stCondLst>
+                                    <p:cond delay="0"/>
+                                  </p:stCondLst>
+                                  <p:childTnLst>
+                                    <p:set>
+                                      <p:cBhvr>
+                                        <p:cTn id="10" dur="1" fill="hold">
+                                          <p:stCondLst>
+                                            <p:cond delay="0"/>
+                                          </p:stCondLst>
+                                        </p:cTn>
+                                        <p:tgtEl>
+                                          <p:spTgt spid="3">
+                                            <p:txEl>
+                                              <p:pRg st="1" end="1"/>
+                                            </p:txEl>
+                                          </p:spTgt>
+                                        </p:tgtEl>
+                                        <p:attrNameLst>
+                                          <p:attrName>style.visibility</p:attrName>
+                                        </p:attrNameLst>
+                                      </p:cBhvr>
+                                      <p:to>
+                                        <p:strVal val="visible"/>
+                                      </p:to>
+                                    </p:set>
+                                  </p:childTnLst>
+                                </p:cTn>
+                              </p:par>
+                            </p:childTnLst>
+                          </p:cTn>
+                        </p:par>
+                      </p:childTnLst>
+                    </p:cTn>
+                  </p:par>
+                  <p:par>
+                    <p:cTn id="11" fill="hold">
+                      <p:stCondLst>
+                        <p:cond delay="indefinite"/>
+                      </p:stCondLst>
+                      <p:childTnLst>
+                        <p:par>
+                          <p:cTn id="12" fill="hold">
+                            <p:stCondLst>
+                              <p:cond delay="0"/>
+                            </p:stCondLst>
+                            <p:childTnLst>
+                              <p:par>
+                                <p:cTn id="13" presetID="1" presetClass="entr" presetSubtype="0" fill="hold" grpId="0" nodeType="clickEffect">
+                                  <p:stCondLst>
+                                    <p:cond delay="0"/>
+                                  </p:stCondLst>
+                                  <p:childTnLst>
+                                    <p:set>
+                                      <p:cBhvr>
+                                        <p:cTn id="14" dur="1" fill="hold">
+                                          <p:stCondLst>
+                                            <p:cond delay="0"/>
+                                          </p:stCondLst>
+                                        </p:cTn>
+                                        <p:tgtEl>
+                                          <p:spTgt spid="3">
+                                            <p:txEl>
+                                              <p:pRg st="2" end="2"/>
+                                            </p:txEl>
+                                          </p:spTgt>
+                                        </p:tgtEl>
+                                        <p:attrNameLst>
+                                          <p:attrName>style.visibility</p:attrName>
+                                        </p:attrNameLst>
+                                      </p:cBhvr>
+                                      <p:to>
+                                        <p:strVal val="visible"/>
+                                      </p:to>
+                                    </p:set>
+                                  </p:childTnLst>
+                                </p:cTn>
+                              </p:par>
+                            </p:childTnLst>
+                          </p:cTn>
+                        </p:par>
+                      </p:childTnLst>
+                    </p:cTn>
+                  </p:par>
+                </p:childTnLst>
+              </p:cTn>
+              <p:prevCondLst>
+                <p:cond evt="onPrev" delay="0">
+                  <p:tgtEl>
+                    <p:sldTgt/>
+                  </p:tgtEl>
+                </p:cond>
+              </p:prevCondLst>
+              <p:nextCondLst>
+                <p:cond evt="onNext" delay="0">
+                  <p:tgtEl>
+                    <p:sldTgt/>
+                  </p:tgtEl>
+                </p:cond>
+              </p:nextCondLst>
+            </p:seq>
+          </p:childTnLst>
+        </p:cTn>
+      </p:par>
+    </p:tnLst>
+    <p:bldLst>
+      <p:bldP spid="3" grpId="0" build="p"/>
+    </p:bldLst>
+  </p:timing>
+</p:sld>
+</file>
+
+<file path=ppt/slides/slide16.xml><?xml version="1.0" encoding="utf-8"?>
+<p:sld xmlns:a="http://schemas.openxmlformats.org/drawingml/2006/main" xmlns:r="http://schemas.openxmlformats.org/officeDocument/2006/relationships" xmlns:p="http://schemas.openxmlformats.org/presentationml/2006/main">
+  <p:cSld>
+    <p:spTree>
+      <p:nvGrpSpPr>
+        <p:cNvPr id="1" name=""/>
+        <p:cNvGrpSpPr/>
+        <p:nvPr/>
+      </p:nvGrpSpPr>
+      <p:grpSpPr>
+        <a:xfrm>
+          <a:off x="0" y="0"/>
+          <a:ext cx="0" cy="0"/>
+          <a:chOff x="0" y="0"/>
+          <a:chExt cx="0" cy="0"/>
+        </a:xfrm>
+      </p:grpSpPr>
+      <p:sp>
+        <p:nvSpPr>
+          <p:cNvPr id="2" name="Title 1"/>
+          <p:cNvSpPr>
+            <a:spLocks noGrp="1"/>
+          </p:cNvSpPr>
+          <p:nvPr>
+            <p:ph type="title"/>
+          </p:nvPr>
+        </p:nvSpPr>
+        <p:spPr/>
+        <p:txBody>
+          <a:bodyPr/>
+          <a:lstStyle/>
+          <a:p>
+            <a:r>
+              <a:rPr lang="en-US" dirty="0"/>
+              <a:t>Sizing your cluster</a:t>
+            </a:r>
+          </a:p>
+        </p:txBody>
+      </p:sp>
+      <p:sp>
+        <p:nvSpPr>
+          <p:cNvPr id="3" name="Content Placeholder 2"/>
+          <p:cNvSpPr>
+            <a:spLocks noGrp="1"/>
+          </p:cNvSpPr>
+          <p:nvPr>
+            <p:ph idx="1"/>
+          </p:nvPr>
+        </p:nvSpPr>
+        <p:spPr>
+          <a:xfrm>
+            <a:off x="457200" y="1200151"/>
+            <a:ext cx="8229600" cy="3394472"/>
+          </a:xfrm>
+        </p:spPr>
+        <p:txBody>
+          <a:bodyPr>
+            <a:normAutofit lnSpcReduction="10000"/>
+          </a:bodyPr>
+          <a:lstStyle/>
+          <a:p>
+            <a:pPr marL="0" indent="0">
+              <a:buNone/>
+            </a:pPr>
+            <a:r>
+              <a:rPr lang="en-US" dirty="0"/>
+              <a:t>Recommended minimum RAM/Disk ratios:</a:t>
+            </a:r>
+          </a:p>
+          <a:p>
+            <a:r>
+              <a:rPr lang="en-US" dirty="0"/>
+              <a:t>For logging –  1:30</a:t>
+            </a:r>
+          </a:p>
+          <a:p>
+            <a:r>
+              <a:rPr lang="en-US" dirty="0"/>
+              <a:t>For search – 1:16</a:t>
+            </a:r>
+          </a:p>
+          <a:p>
+            <a:endParaRPr lang="en-US" dirty="0"/>
+          </a:p>
+          <a:p>
+            <a:pPr marL="0" indent="0">
+              <a:buNone/>
+            </a:pPr>
+            <a:r>
+              <a:rPr lang="en-US" dirty="0"/>
+              <a:t>Make sure you have enough disk space to receive shards after loss of nodes. Plus 20%</a:t>
+            </a:r>
+          </a:p>
+          <a:p>
+            <a:endParaRPr lang="en-US" dirty="0"/>
+          </a:p>
+        </p:txBody>
+      </p:sp>
+      <p:sp>
+        <p:nvSpPr>
+          <p:cNvPr id="4" name="TextBox 3">
+            <a:extLst>
+              <a:ext uri="{FF2B5EF4-FFF2-40B4-BE49-F238E27FC236}">
+                <a16:creationId xmlns:a16="http://schemas.microsoft.com/office/drawing/2014/main" id="{2F06FA5D-F37F-834C-B309-3957287EA547}"/>
+              </a:ext>
+            </a:extLst>
+          </p:cNvPr>
+          <p:cNvSpPr txBox="1"/>
+          <p:nvPr/>
+        </p:nvSpPr>
+        <p:spPr>
+          <a:xfrm>
+            <a:off x="6873871" y="4705350"/>
+            <a:ext cx="2101857" cy="276999"/>
+          </a:xfrm>
+          <a:prstGeom prst="rect">
+            <a:avLst/>
+          </a:prstGeom>
+          <a:noFill/>
+        </p:spPr>
+        <p:txBody>
+          <a:bodyPr wrap="none" rtlCol="0">
+            <a:spAutoFit/>
+          </a:bodyPr>
+          <a:lstStyle/>
+          <a:p>
+            <a:r>
+              <a:rPr lang="en-AU" sz="1200" dirty="0">
+                <a:solidFill>
+                  <a:schemeClr val="bg1">
+                    <a:lumMod val="75000"/>
+                  </a:schemeClr>
+                </a:solidFill>
+              </a:rPr>
+              <a:t>© copyright REA Group Ltd</a:t>
+            </a:r>
+            <a:endParaRPr lang="en-US" sz="1200" dirty="0">
+              <a:solidFill>
+                <a:schemeClr val="bg1">
+                  <a:lumMod val="75000"/>
+                </a:schemeClr>
+              </a:solidFill>
+            </a:endParaRPr>
+          </a:p>
+        </p:txBody>
+      </p:sp>
+    </p:spTree>
+    <p:extLst>
+      <p:ext uri="{BB962C8B-B14F-4D97-AF65-F5344CB8AC3E}">
+        <p14:creationId xmlns:p14="http://schemas.microsoft.com/office/powerpoint/2010/main" val="1149575776"/>
+      </p:ext>
+    </p:extLst>
+  </p:cSld>
+  <p:clrMapOvr>
+    <a:masterClrMapping/>
+  </p:clrMapOvr>
+  <p:timing>
+    <p:tnLst>
+      <p:par>
+        <p:cTn id="1" dur="indefinite" restart="never" nodeType="tmRoot">
+          <p:childTnLst>
+            <p:seq concurrent="1" nextAc="seek">
+              <p:cTn id="2" dur="indefinite" nodeType="mainSeq">
+                <p:childTnLst>
+                  <p:par>
+                    <p:cTn id="3" fill="hold">
+                      <p:stCondLst>
+                        <p:cond delay="indefinite"/>
+                      </p:stCondLst>
+                      <p:childTnLst>
+                        <p:par>
+                          <p:cTn id="4" fill="hold">
+                            <p:stCondLst>
+                              <p:cond delay="0"/>
+                            </p:stCondLst>
+                            <p:childTnLst>
+                              <p:par>
+                                <p:cTn id="5" presetID="1" presetClass="entr" presetSubtype="0" fill="hold" grpId="0" nodeType="clickEffect">
+                                  <p:stCondLst>
+                                    <p:cond delay="0"/>
+                                  </p:stCondLst>
+                                  <p:childTnLst>
+                                    <p:set>
+                                      <p:cBhvr>
+                                        <p:cTn id="6" dur="1" fill="hold">
+                                          <p:stCondLst>
+                                            <p:cond delay="0"/>
+                                          </p:stCondLst>
+                                        </p:cTn>
+                                        <p:tgtEl>
+                                          <p:spTgt spid="3">
+                                            <p:txEl>
+                                              <p:pRg st="0" end="0"/>
+                                            </p:txEl>
+                                          </p:spTgt>
+                                        </p:tgtEl>
+                                        <p:attrNameLst>
+                                          <p:attrName>style.visibility</p:attrName>
+                                        </p:attrNameLst>
+                                      </p:cBhvr>
+                                      <p:to>
+                                        <p:strVal val="visible"/>
+                                      </p:to>
+                                    </p:set>
+                                  </p:childTnLst>
+                                </p:cTn>
+                              </p:par>
+                            </p:childTnLst>
+                          </p:cTn>
+                        </p:par>
+                      </p:childTnLst>
+                    </p:cTn>
+                  </p:par>
+                  <p:par>
+                    <p:cTn id="7" fill="hold">
+                      <p:stCondLst>
+                        <p:cond delay="indefinite"/>
+                      </p:stCondLst>
+                      <p:childTnLst>
+                        <p:par>
+                          <p:cTn id="8" fill="hold">
+                            <p:stCondLst>
+                              <p:cond delay="0"/>
+                            </p:stCondLst>
+                            <p:childTnLst>
+                              <p:par>
+                                <p:cTn id="9" presetID="1" presetClass="entr" presetSubtype="0" fill="hold" grpId="0" nodeType="clickEffect">
+                                  <p:stCondLst>
+                                    <p:cond delay="0"/>
+                                  </p:stCondLst>
+                                  <p:childTnLst>
+                                    <p:set>
+                                      <p:cBhvr>
+                                        <p:cTn id="10" dur="1" fill="hold">
+                                          <p:stCondLst>
+                                            <p:cond delay="0"/>
+                                          </p:stCondLst>
+                                        </p:cTn>
+                                        <p:tgtEl>
+                                          <p:spTgt spid="3">
+                                            <p:txEl>
+                                              <p:pRg st="1" end="1"/>
+                                            </p:txEl>
+                                          </p:spTgt>
+                                        </p:tgtEl>
+                                        <p:attrNameLst>
+                                          <p:attrName>style.visibility</p:attrName>
+                                        </p:attrNameLst>
+                                      </p:cBhvr>
+                                      <p:to>
+                                        <p:strVal val="visible"/>
+                                      </p:to>
+                                    </p:set>
+                                  </p:childTnLst>
+                                </p:cTn>
+                              </p:par>
+                            </p:childTnLst>
+                          </p:cTn>
+                        </p:par>
+                      </p:childTnLst>
+                    </p:cTn>
+                  </p:par>
+                  <p:par>
+                    <p:cTn id="11" fill="hold">
+                      <p:stCondLst>
+                        <p:cond delay="indefinite"/>
+                      </p:stCondLst>
+                      <p:childTnLst>
+                        <p:par>
+                          <p:cTn id="12" fill="hold">
+                            <p:stCondLst>
+                              <p:cond delay="0"/>
+                            </p:stCondLst>
+                            <p:childTnLst>
+                              <p:par>
+                                <p:cTn id="13" presetID="1" presetClass="entr" presetSubtype="0" fill="hold" grpId="0" nodeType="clickEffect">
+                                  <p:stCondLst>
+                                    <p:cond delay="0"/>
+                                  </p:stCondLst>
+                                  <p:childTnLst>
+                                    <p:set>
+                                      <p:cBhvr>
+                                        <p:cTn id="14" dur="1" fill="hold">
+                                          <p:stCondLst>
+                                            <p:cond delay="0"/>
+                                          </p:stCondLst>
+                                        </p:cTn>
+                                        <p:tgtEl>
+                                          <p:spTgt spid="3">
+                                            <p:txEl>
+                                              <p:pRg st="2" end="2"/>
+                                            </p:txEl>
+                                          </p:spTgt>
+                                        </p:tgtEl>
+                                        <p:attrNameLst>
+                                          <p:attrName>style.visibility</p:attrName>
+                                        </p:attrNameLst>
+                                      </p:cBhvr>
+                                      <p:to>
+                                        <p:strVal val="visible"/>
+                                      </p:to>
+                                    </p:set>
+                                  </p:childTnLst>
+                                </p:cTn>
+                              </p:par>
+                            </p:childTnLst>
+                          </p:cTn>
+                        </p:par>
+                      </p:childTnLst>
+                    </p:cTn>
+                  </p:par>
+                  <p:par>
+                    <p:cTn id="15" fill="hold">
+                      <p:stCondLst>
+                        <p:cond delay="indefinite"/>
+                      </p:stCondLst>
+                      <p:childTnLst>
+                        <p:par>
+                          <p:cTn id="16" fill="hold">
+                            <p:stCondLst>
+                              <p:cond delay="0"/>
+                            </p:stCondLst>
+                            <p:childTnLst>
+                              <p:par>
+                                <p:cTn id="17" presetID="1" presetClass="entr" presetSubtype="0" fill="hold" grpId="0" nodeType="clickEffect">
+                                  <p:stCondLst>
+                                    <p:cond delay="0"/>
+                                  </p:stCondLst>
+                                  <p:childTnLst>
+                                    <p:set>
+                                      <p:cBhvr>
+                                        <p:cTn id="18" dur="1" fill="hold">
+                                          <p:stCondLst>
+                                            <p:cond delay="0"/>
+                                          </p:stCondLst>
+                                        </p:cTn>
+                                        <p:tgtEl>
+                                          <p:spTgt spid="3">
+                                            <p:txEl>
+                                              <p:pRg st="4" end="4"/>
+                                            </p:txEl>
+                                          </p:spTgt>
+                                        </p:tgtEl>
+                                        <p:attrNameLst>
+                                          <p:attrName>style.visibility</p:attrName>
+                                        </p:attrNameLst>
+                                      </p:cBhvr>
+                                      <p:to>
+                                        <p:strVal val="visible"/>
+                                      </p:to>
+                                    </p:set>
+                                  </p:childTnLst>
+                                </p:cTn>
+                              </p:par>
+                            </p:childTnLst>
+                          </p:cTn>
+                        </p:par>
+                      </p:childTnLst>
+                    </p:cTn>
+                  </p:par>
+                </p:childTnLst>
+              </p:cTn>
+              <p:prevCondLst>
+                <p:cond evt="onPrev" delay="0">
+                  <p:tgtEl>
+                    <p:sldTgt/>
+                  </p:tgtEl>
+                </p:cond>
+              </p:prevCondLst>
+              <p:nextCondLst>
+                <p:cond evt="onNext" delay="0">
+                  <p:tgtEl>
+                    <p:sldTgt/>
+                  </p:tgtEl>
+                </p:cond>
+              </p:nextCondLst>
+            </p:seq>
+          </p:childTnLst>
+        </p:cTn>
+      </p:par>
+    </p:tnLst>
+    <p:bldLst>
+      <p:bldP spid="3" grpId="0" build="p"/>
+    </p:bldLst>
+  </p:timing>
+</p:sld>
+</file>
+
+<file path=ppt/slides/slide17.xml><?xml version="1.0" encoding="utf-8"?>
+<p:sld xmlns:a="http://schemas.openxmlformats.org/drawingml/2006/main" xmlns:r="http://schemas.openxmlformats.org/officeDocument/2006/relationships" xmlns:p="http://schemas.openxmlformats.org/presentationml/2006/main">
+  <p:cSld>
+    <p:spTree>
+      <p:nvGrpSpPr>
+        <p:cNvPr id="1" name=""/>
+        <p:cNvGrpSpPr/>
+        <p:nvPr/>
+      </p:nvGrpSpPr>
+      <p:grpSpPr>
+        <a:xfrm>
+          <a:off x="0" y="0"/>
+          <a:ext cx="0" cy="0"/>
+          <a:chOff x="0" y="0"/>
+          <a:chExt cx="0" cy="0"/>
+        </a:xfrm>
+      </p:grpSpPr>
+      <p:sp>
+        <p:nvSpPr>
           <p:cNvPr id="2" name="Title 1"/>
           <p:cNvSpPr>
             <a:spLocks noGrp="1"/>
@@ -5738,7 +7033,7 @@
 </p:sld>
 </file>
 
-<file path=ppt/slides/slide14.xml><?xml version="1.0" encoding="utf-8"?>
+<file path=ppt/slides/slide18.xml><?xml version="1.0" encoding="utf-8"?>
 <p:sld xmlns:a="http://schemas.openxmlformats.org/drawingml/2006/main" xmlns:r="http://schemas.openxmlformats.org/officeDocument/2006/relationships" xmlns:p="http://schemas.openxmlformats.org/presentationml/2006/main">
   <p:cSld>
     <p:spTree>
@@ -6294,7 +7589,7 @@
 </p:sld>
 </file>
 
-<file path=ppt/slides/slide15.xml><?xml version="1.0" encoding="utf-8"?>
+<file path=ppt/slides/slide19.xml><?xml version="1.0" encoding="utf-8"?>
 <p:sld xmlns:a="http://schemas.openxmlformats.org/drawingml/2006/main" xmlns:r="http://schemas.openxmlformats.org/officeDocument/2006/relationships" xmlns:p="http://schemas.openxmlformats.org/presentationml/2006/main">
   <p:cSld>
     <p:spTree>
@@ -6395,7 +7690,95 @@
 </p:sld>
 </file>
 
-<file path=ppt/slides/slide16.xml><?xml version="1.0" encoding="utf-8"?>
+<file path=ppt/slides/slide2.xml><?xml version="1.0" encoding="utf-8"?>
+<p:sld xmlns:a="http://schemas.openxmlformats.org/drawingml/2006/main" xmlns:r="http://schemas.openxmlformats.org/officeDocument/2006/relationships" xmlns:p="http://schemas.openxmlformats.org/presentationml/2006/main">
+  <p:cSld>
+    <p:spTree>
+      <p:nvGrpSpPr>
+        <p:cNvPr id="1" name=""/>
+        <p:cNvGrpSpPr/>
+        <p:nvPr/>
+      </p:nvGrpSpPr>
+      <p:grpSpPr>
+        <a:xfrm>
+          <a:off x="0" y="0"/>
+          <a:ext cx="0" cy="0"/>
+          <a:chOff x="0" y="0"/>
+          <a:chExt cx="0" cy="0"/>
+        </a:xfrm>
+      </p:grpSpPr>
+      <p:sp>
+        <p:nvSpPr>
+          <p:cNvPr id="2" name="Title 1"/>
+          <p:cNvSpPr>
+            <a:spLocks noGrp="1"/>
+          </p:cNvSpPr>
+          <p:nvPr>
+            <p:ph type="title"/>
+          </p:nvPr>
+        </p:nvSpPr>
+        <p:spPr/>
+        <p:txBody>
+          <a:bodyPr/>
+          <a:lstStyle/>
+          <a:p>
+            <a:r>
+              <a:rPr lang="en-US" dirty="0"/>
+              <a:t>Nodes, shards, clusters, etc.</a:t>
+            </a:r>
+          </a:p>
+        </p:txBody>
+      </p:sp>
+      <p:sp>
+        <p:nvSpPr>
+          <p:cNvPr id="3" name="TextBox 2">
+            <a:extLst>
+              <a:ext uri="{FF2B5EF4-FFF2-40B4-BE49-F238E27FC236}">
+                <a16:creationId xmlns:a16="http://schemas.microsoft.com/office/drawing/2014/main" id="{E55A1FA1-DDCD-4542-94BF-FCFF3D506721}"/>
+              </a:ext>
+            </a:extLst>
+          </p:cNvPr>
+          <p:cNvSpPr txBox="1"/>
+          <p:nvPr/>
+        </p:nvSpPr>
+        <p:spPr>
+          <a:xfrm>
+            <a:off x="457200" y="4705350"/>
+            <a:ext cx="2101857" cy="276999"/>
+          </a:xfrm>
+          <a:prstGeom prst="rect">
+            <a:avLst/>
+          </a:prstGeom>
+          <a:noFill/>
+        </p:spPr>
+        <p:txBody>
+          <a:bodyPr wrap="none" rtlCol="0">
+            <a:spAutoFit/>
+          </a:bodyPr>
+          <a:lstStyle/>
+          <a:p>
+            <a:r>
+              <a:rPr lang="en-AU" sz="1200" dirty="0"/>
+              <a:t>© copyright REA Group Ltd</a:t>
+            </a:r>
+            <a:endParaRPr lang="en-US" sz="1200" dirty="0"/>
+          </a:p>
+        </p:txBody>
+      </p:sp>
+    </p:spTree>
+    <p:extLst>
+      <p:ext uri="{BB962C8B-B14F-4D97-AF65-F5344CB8AC3E}">
+        <p14:creationId xmlns:p14="http://schemas.microsoft.com/office/powerpoint/2010/main" val="3986225731"/>
+      </p:ext>
+    </p:extLst>
+  </p:cSld>
+  <p:clrMapOvr>
+    <a:masterClrMapping/>
+  </p:clrMapOvr>
+</p:sld>
+</file>
+
+<file path=ppt/slides/slide20.xml><?xml version="1.0" encoding="utf-8"?>
 <p:sld xmlns:a="http://schemas.openxmlformats.org/drawingml/2006/main" xmlns:r="http://schemas.openxmlformats.org/officeDocument/2006/relationships" xmlns:p="http://schemas.openxmlformats.org/presentationml/2006/main">
   <p:cSld>
     <p:spTree>
@@ -6879,7 +8262,7 @@
 </p:sld>
 </file>
 
-<file path=ppt/slides/slide17.xml><?xml version="1.0" encoding="utf-8"?>
+<file path=ppt/slides/slide21.xml><?xml version="1.0" encoding="utf-8"?>
 <p:sld xmlns:a="http://schemas.openxmlformats.org/drawingml/2006/main" xmlns:r="http://schemas.openxmlformats.org/officeDocument/2006/relationships" xmlns:p="http://schemas.openxmlformats.org/presentationml/2006/main">
   <p:cSld>
     <p:spTree>
@@ -7758,7 +9141,7 @@
 </p:sld>
 </file>
 
-<file path=ppt/slides/slide18.xml><?xml version="1.0" encoding="utf-8"?>
+<file path=ppt/slides/slide22.xml><?xml version="1.0" encoding="utf-8"?>
 <p:sld xmlns:a="http://schemas.openxmlformats.org/drawingml/2006/main" xmlns:r="http://schemas.openxmlformats.org/officeDocument/2006/relationships" xmlns:p="http://schemas.openxmlformats.org/presentationml/2006/main">
   <p:cSld>
     <p:spTree>
@@ -8556,94 +9939,6 @@
     <p:extLst>
       <p:ext uri="{BB962C8B-B14F-4D97-AF65-F5344CB8AC3E}">
         <p14:creationId xmlns:p14="http://schemas.microsoft.com/office/powerpoint/2010/main" val="210141400"/>
-      </p:ext>
-    </p:extLst>
-  </p:cSld>
-  <p:clrMapOvr>
-    <a:masterClrMapping/>
-  </p:clrMapOvr>
-</p:sld>
-</file>
-
-<file path=ppt/slides/slide2.xml><?xml version="1.0" encoding="utf-8"?>
-<p:sld xmlns:a="http://schemas.openxmlformats.org/drawingml/2006/main" xmlns:r="http://schemas.openxmlformats.org/officeDocument/2006/relationships" xmlns:p="http://schemas.openxmlformats.org/presentationml/2006/main">
-  <p:cSld>
-    <p:spTree>
-      <p:nvGrpSpPr>
-        <p:cNvPr id="1" name=""/>
-        <p:cNvGrpSpPr/>
-        <p:nvPr/>
-      </p:nvGrpSpPr>
-      <p:grpSpPr>
-        <a:xfrm>
-          <a:off x="0" y="0"/>
-          <a:ext cx="0" cy="0"/>
-          <a:chOff x="0" y="0"/>
-          <a:chExt cx="0" cy="0"/>
-        </a:xfrm>
-      </p:grpSpPr>
-      <p:sp>
-        <p:nvSpPr>
-          <p:cNvPr id="2" name="Title 1"/>
-          <p:cNvSpPr>
-            <a:spLocks noGrp="1"/>
-          </p:cNvSpPr>
-          <p:nvPr>
-            <p:ph type="title"/>
-          </p:nvPr>
-        </p:nvSpPr>
-        <p:spPr/>
-        <p:txBody>
-          <a:bodyPr/>
-          <a:lstStyle/>
-          <a:p>
-            <a:r>
-              <a:rPr lang="en-US" dirty="0"/>
-              <a:t>Nodes, shards, clusters, etc.</a:t>
-            </a:r>
-          </a:p>
-        </p:txBody>
-      </p:sp>
-      <p:sp>
-        <p:nvSpPr>
-          <p:cNvPr id="3" name="TextBox 2">
-            <a:extLst>
-              <a:ext uri="{FF2B5EF4-FFF2-40B4-BE49-F238E27FC236}">
-                <a16:creationId xmlns:a16="http://schemas.microsoft.com/office/drawing/2014/main" id="{E55A1FA1-DDCD-4542-94BF-FCFF3D506721}"/>
-              </a:ext>
-            </a:extLst>
-          </p:cNvPr>
-          <p:cNvSpPr txBox="1"/>
-          <p:nvPr/>
-        </p:nvSpPr>
-        <p:spPr>
-          <a:xfrm>
-            <a:off x="457200" y="4705350"/>
-            <a:ext cx="2101857" cy="276999"/>
-          </a:xfrm>
-          <a:prstGeom prst="rect">
-            <a:avLst/>
-          </a:prstGeom>
-          <a:noFill/>
-        </p:spPr>
-        <p:txBody>
-          <a:bodyPr wrap="none" rtlCol="0">
-            <a:spAutoFit/>
-          </a:bodyPr>
-          <a:lstStyle/>
-          <a:p>
-            <a:r>
-              <a:rPr lang="en-AU" sz="1200" dirty="0"/>
-              <a:t>© copyright REA Group Ltd</a:t>
-            </a:r>
-            <a:endParaRPr lang="en-US" sz="1200" dirty="0"/>
-          </a:p>
-        </p:txBody>
-      </p:sp>
-    </p:spTree>
-    <p:extLst>
-      <p:ext uri="{BB962C8B-B14F-4D97-AF65-F5344CB8AC3E}">
-        <p14:creationId xmlns:p14="http://schemas.microsoft.com/office/powerpoint/2010/main" val="3986225731"/>
       </p:ext>
     </p:extLst>
   </p:cSld>

</xml_diff>

<commit_message>
Minor fixes to powerpoint presentation.
</commit_message>
<xml_diff>
--- a/ElasticsearchOps.pptx
+++ b/ElasticsearchOps.pptx
@@ -229,7 +229,7 @@
           <a:p>
             <a:fld id="{B0160BEC-550A-4FF5-8A23-3504083A2721}" type="datetimeFigureOut">
               <a:rPr lang="en-US" smtClean="0"/>
-              <a:t>6/30/19</a:t>
+              <a:t>7/7/19</a:t>
             </a:fld>
             <a:endParaRPr lang="en-US" dirty="0"/>
           </a:p>
@@ -5780,7 +5780,7 @@
             <a:pPr lvl="1"/>
             <a:r>
               <a:rPr lang="en-US" dirty="0"/>
-              <a:t>No more than 30Gb</a:t>
+              <a:t>No more than 30GB</a:t>
             </a:r>
           </a:p>
           <a:p>
@@ -5793,7 +5793,7 @@
           <a:p>
             <a:r>
               <a:rPr lang="en-US" dirty="0"/>
-              <a:t>Typical: 8 to 16 cores with 64Gb RAM</a:t>
+              <a:t>Typical: 8 to 16 cores with 64GB RAM</a:t>
             </a:r>
           </a:p>
           <a:p>
@@ -5805,7 +5805,7 @@
           <a:p>
             <a:r>
               <a:rPr lang="en-US" dirty="0"/>
-              <a:t>Master nodes can be small (e.g. 8Gb)</a:t>
+              <a:t>Master nodes can be small (e.g. 8GB)</a:t>
             </a:r>
           </a:p>
           <a:p>
@@ -6290,13 +6290,13 @@
           <a:p>
             <a:r>
               <a:rPr lang="en-US" dirty="0"/>
-              <a:t>Max of 20 shards per Gb of JVM Heap</a:t>
+              <a:t>Max of 20 shards per GB of JVM Heap</a:t>
             </a:r>
           </a:p>
           <a:p>
             <a:r>
               <a:rPr lang="en-US" dirty="0"/>
-              <a:t>Max of 40Gb per shard</a:t>
+              <a:t>Max of 40GB per shard</a:t>
             </a:r>
           </a:p>
           <a:p>
@@ -6602,7 +6602,7 @@
         </p:spPr>
         <p:txBody>
           <a:bodyPr>
-            <a:normAutofit lnSpcReduction="10000"/>
+            <a:normAutofit fontScale="92500"/>
           </a:bodyPr>
           <a:lstStyle/>
           <a:p>
@@ -6617,8 +6617,13 @@
           <a:p>
             <a:r>
               <a:rPr lang="en-US" dirty="0"/>
-              <a:t>For logging –  1:30</a:t>
-            </a:r>
+              <a:t>For logging –  1:30 </a:t>
+            </a:r>
+            <a:r>
+              <a:rPr lang="en-US" sz="2600" dirty="0"/>
+              <a:t>(i.e. 1GB RAM per 30GB disk)</a:t>
+            </a:r>
+            <a:endParaRPr lang="en-US" dirty="0"/>
           </a:p>
           <a:p>
             <a:r>

</xml_diff>

<commit_message>
Minor fixes and enhancements
- Fix parent/child diagram
- Add comment on reading/writing documents
- modify power point presentation:
  - Master nodes can actually run on 4G machines.
  - Cannot change shard count on snapshot restore.  Need to use _reindex or completely refeed.
</commit_message>
<xml_diff>
--- a/ElasticsearchOps.pptx
+++ b/ElasticsearchOps.pptx
@@ -229,7 +229,7 @@
           <a:p>
             <a:fld id="{B0160BEC-550A-4FF5-8A23-3504083A2721}" type="datetimeFigureOut">
               <a:rPr lang="en-US" smtClean="0"/>
-              <a:t>7/7/19</a:t>
+              <a:t>2/25/21</a:t>
             </a:fld>
             <a:endParaRPr lang="en-US" dirty="0"/>
           </a:p>
@@ -5805,7 +5805,7 @@
           <a:p>
             <a:r>
               <a:rPr lang="en-US" dirty="0"/>
-              <a:t>Master nodes can be small (e.g. 8GB)</a:t>
+              <a:t>Master nodes can be small (e.g. 4GB)</a:t>
             </a:r>
           </a:p>
           <a:p>
@@ -13210,6 +13210,20 @@
             </a:r>
             <a:r>
               <a:rPr lang="en-US" b="1" dirty="0"/>
+              <a:t>can</a:t>
+            </a:r>
+            <a:r>
+              <a:rPr lang="en-US" dirty="0"/>
+              <a:t> modify the replica count</a:t>
+            </a:r>
+          </a:p>
+          <a:p>
+            <a:r>
+              <a:rPr lang="en-US" dirty="0"/>
+              <a:t>You </a:t>
+            </a:r>
+            <a:r>
+              <a:rPr lang="en-US" b="1" dirty="0"/>
               <a:t>cannot</a:t>
             </a:r>
             <a:r>
@@ -13218,17 +13232,27 @@
             </a:r>
           </a:p>
           <a:p>
+            <a:pPr lvl="1"/>
             <a:r>
               <a:rPr lang="en-US" dirty="0"/>
-              <a:t>You </a:t>
-            </a:r>
-            <a:r>
-              <a:rPr lang="en-US" b="1" dirty="0"/>
-              <a:t>can</a:t>
-            </a:r>
+              <a:t>Including when restoring from a snapshot</a:t>
+            </a:r>
+          </a:p>
+          <a:p>
+            <a:pPr lvl="1"/>
             <a:r>
               <a:rPr lang="en-US" dirty="0"/>
-              <a:t> modify the replica count</a:t>
+              <a:t>Need to use </a:t>
+            </a:r>
+            <a:r>
+              <a:rPr lang="en-US" dirty="0">
+                <a:latin typeface="Courier" pitchFamily="2" charset="0"/>
+              </a:rPr>
+              <a:t>_reindex </a:t>
+            </a:r>
+            <a:r>
+              <a:rPr lang="en-US" dirty="0"/>
+              <a:t>or do a re-feed.</a:t>
             </a:r>
           </a:p>
           <a:p>
@@ -13380,6 +13404,104 @@
                                           <p:spTgt spid="3">
                                             <p:txEl>
                                               <p:pRg st="2" end="2"/>
+                                            </p:txEl>
+                                          </p:spTgt>
+                                        </p:tgtEl>
+                                        <p:attrNameLst>
+                                          <p:attrName>style.visibility</p:attrName>
+                                        </p:attrNameLst>
+                                      </p:cBhvr>
+                                      <p:to>
+                                        <p:strVal val="visible"/>
+                                      </p:to>
+                                    </p:set>
+                                  </p:childTnLst>
+                                </p:cTn>
+                              </p:par>
+                            </p:childTnLst>
+                          </p:cTn>
+                        </p:par>
+                      </p:childTnLst>
+                    </p:cTn>
+                  </p:par>
+                  <p:par>
+                    <p:cTn id="11" fill="hold">
+                      <p:stCondLst>
+                        <p:cond delay="indefinite"/>
+                      </p:stCondLst>
+                      <p:childTnLst>
+                        <p:par>
+                          <p:cTn id="12" fill="hold">
+                            <p:stCondLst>
+                              <p:cond delay="0"/>
+                            </p:stCondLst>
+                            <p:childTnLst>
+                              <p:par>
+                                <p:cTn id="13" presetID="1" presetClass="entr" presetSubtype="0" fill="hold" nodeType="clickEffect">
+                                  <p:stCondLst>
+                                    <p:cond delay="0"/>
+                                  </p:stCondLst>
+                                  <p:childTnLst>
+                                    <p:set>
+                                      <p:cBhvr>
+                                        <p:cTn id="14" dur="1" fill="hold">
+                                          <p:stCondLst>
+                                            <p:cond delay="0"/>
+                                          </p:stCondLst>
+                                        </p:cTn>
+                                        <p:tgtEl>
+                                          <p:spTgt spid="3">
+                                            <p:txEl>
+                                              <p:pRg st="3" end="3"/>
+                                            </p:txEl>
+                                          </p:spTgt>
+                                        </p:tgtEl>
+                                        <p:attrNameLst>
+                                          <p:attrName>style.visibility</p:attrName>
+                                        </p:attrNameLst>
+                                      </p:cBhvr>
+                                      <p:to>
+                                        <p:strVal val="visible"/>
+                                      </p:to>
+                                    </p:set>
+                                  </p:childTnLst>
+                                </p:cTn>
+                              </p:par>
+                            </p:childTnLst>
+                          </p:cTn>
+                        </p:par>
+                      </p:childTnLst>
+                    </p:cTn>
+                  </p:par>
+                  <p:par>
+                    <p:cTn id="15" fill="hold">
+                      <p:stCondLst>
+                        <p:cond delay="indefinite"/>
+                      </p:stCondLst>
+                      <p:childTnLst>
+                        <p:par>
+                          <p:cTn id="16" fill="hold">
+                            <p:stCondLst>
+                              <p:cond delay="0"/>
+                            </p:stCondLst>
+                            <p:childTnLst>
+                              <p:par>
+                                <p:cTn id="17" presetID="1" presetClass="entr" presetSubtype="0" fill="hold" nodeType="clickEffect">
+                                  <p:stCondLst>
+                                    <p:cond delay="0"/>
+                                  </p:stCondLst>
+                                  <p:childTnLst>
+                                    <p:set>
+                                      <p:cBhvr>
+                                        <p:cTn id="18" dur="1" fill="hold">
+                                          <p:stCondLst>
+                                            <p:cond delay="0"/>
+                                          </p:stCondLst>
+                                        </p:cTn>
+                                        <p:tgtEl>
+                                          <p:spTgt spid="3">
+                                            <p:txEl>
+                                              <p:pRg st="4" end="4"/>
                                             </p:txEl>
                                           </p:spTgt>
                                         </p:tgtEl>

</xml_diff>

<commit_message>
We have masters running on 2G servers
Update the powerpoint presentation to indicate that masters can actually be 2G servers.  Our listings search masters are only t3a.small with 2G of RAM.
</commit_message>
<xml_diff>
--- a/ElasticsearchOps.pptx
+++ b/ElasticsearchOps.pptx
@@ -5805,7 +5805,15 @@
           <a:p>
             <a:r>
               <a:rPr lang="en-US" dirty="0"/>
-              <a:t>Master nodes can be small (e.g. 4GB)</a:t>
+              <a:t>Master nodes can be small (e.g. </a:t>
+            </a:r>
+            <a:r>
+              <a:rPr lang="en-US"/>
+              <a:t>2GB</a:t>
+            </a:r>
+            <a:r>
+              <a:rPr lang="en-US" dirty="0"/>
+              <a:t>)</a:t>
             </a:r>
           </a:p>
           <a:p>

</xml_diff>

<commit_message>
Minor changes to examples and power point presentation
Main change to the power point is to try to make it easier to explain dedicated master nodes.  I don't know of anyone in REA using dedicated client nodes and AWS Elasticsearch doesn't even support them.
</commit_message>
<xml_diff>
--- a/ElasticsearchOps.pptx
+++ b/ElasticsearchOps.pptx
@@ -19,7 +19,7 @@
     <p:sldId id="285" r:id="rId10"/>
     <p:sldId id="284" r:id="rId11"/>
     <p:sldId id="283" r:id="rId12"/>
-    <p:sldId id="278" r:id="rId13"/>
+    <p:sldId id="302" r:id="rId13"/>
     <p:sldId id="297" r:id="rId14"/>
     <p:sldId id="298" r:id="rId15"/>
     <p:sldId id="299" r:id="rId16"/>
@@ -229,7 +229,7 @@
           <a:p>
             <a:fld id="{B0160BEC-550A-4FF5-8A23-3504083A2721}" type="datetimeFigureOut">
               <a:rPr lang="en-US" smtClean="0"/>
-              <a:t>6/24/21</a:t>
+              <a:t>6/30/21</a:t>
             </a:fld>
             <a:endParaRPr lang="en-US" dirty="0"/>
           </a:p>
@@ -645,90 +645,6 @@
           <a:p>
             <a:fld id="{FF51CD68-44D3-4681-9782-B8CA0706D3C3}" type="slidenum">
               <a:rPr lang="en-US" smtClean="0"/>
-              <a:t>12</a:t>
-            </a:fld>
-            <a:endParaRPr lang="en-US" dirty="0"/>
-          </a:p>
-        </p:txBody>
-      </p:sp>
-    </p:spTree>
-    <p:extLst>
-      <p:ext uri="{BB962C8B-B14F-4D97-AF65-F5344CB8AC3E}">
-        <p14:creationId xmlns:p14="http://schemas.microsoft.com/office/powerpoint/2010/main" val="2259855765"/>
-      </p:ext>
-    </p:extLst>
-  </p:cSld>
-  <p:clrMapOvr>
-    <a:masterClrMapping/>
-  </p:clrMapOvr>
-</p:notes>
-</file>
-
-<file path=ppt/notesSlides/notesSlide3.xml><?xml version="1.0" encoding="utf-8"?>
-<p:notes xmlns:a="http://schemas.openxmlformats.org/drawingml/2006/main" xmlns:r="http://schemas.openxmlformats.org/officeDocument/2006/relationships" xmlns:p="http://schemas.openxmlformats.org/presentationml/2006/main">
-  <p:cSld>
-    <p:spTree>
-      <p:nvGrpSpPr>
-        <p:cNvPr id="1" name=""/>
-        <p:cNvGrpSpPr/>
-        <p:nvPr/>
-      </p:nvGrpSpPr>
-      <p:grpSpPr>
-        <a:xfrm>
-          <a:off x="0" y="0"/>
-          <a:ext cx="0" cy="0"/>
-          <a:chOff x="0" y="0"/>
-          <a:chExt cx="0" cy="0"/>
-        </a:xfrm>
-      </p:grpSpPr>
-      <p:sp>
-        <p:nvSpPr>
-          <p:cNvPr id="2" name="Slide Image Placeholder 1"/>
-          <p:cNvSpPr>
-            <a:spLocks noGrp="1" noRot="1" noChangeAspect="1"/>
-          </p:cNvSpPr>
-          <p:nvPr>
-            <p:ph type="sldImg"/>
-          </p:nvPr>
-        </p:nvSpPr>
-        <p:spPr/>
-      </p:sp>
-      <p:sp>
-        <p:nvSpPr>
-          <p:cNvPr id="3" name="Notes Placeholder 2"/>
-          <p:cNvSpPr>
-            <a:spLocks noGrp="1"/>
-          </p:cNvSpPr>
-          <p:nvPr>
-            <p:ph type="body" idx="1"/>
-          </p:nvPr>
-        </p:nvSpPr>
-        <p:spPr/>
-        <p:txBody>
-          <a:bodyPr/>
-          <a:lstStyle/>
-          <a:p>
-            <a:endParaRPr lang="en-US" dirty="0"/>
-          </a:p>
-        </p:txBody>
-      </p:sp>
-      <p:sp>
-        <p:nvSpPr>
-          <p:cNvPr id="4" name="Slide Number Placeholder 3"/>
-          <p:cNvSpPr>
-            <a:spLocks noGrp="1"/>
-          </p:cNvSpPr>
-          <p:nvPr>
-            <p:ph type="sldNum" sz="quarter" idx="10"/>
-          </p:nvPr>
-        </p:nvSpPr>
-        <p:spPr/>
-        <p:txBody>
-          <a:bodyPr/>
-          <a:lstStyle/>
-          <a:p>
-            <a:fld id="{FF51CD68-44D3-4681-9782-B8CA0706D3C3}" type="slidenum">
-              <a:rPr lang="en-US" smtClean="0"/>
               <a:t>21</a:t>
             </a:fld>
             <a:endParaRPr lang="en-US" dirty="0"/>
@@ -748,7 +664,7 @@
 </p:notes>
 </file>
 
-<file path=ppt/notesSlides/notesSlide4.xml><?xml version="1.0" encoding="utf-8"?>
+<file path=ppt/notesSlides/notesSlide3.xml><?xml version="1.0" encoding="utf-8"?>
 <p:notes xmlns:a="http://schemas.openxmlformats.org/drawingml/2006/main" xmlns:r="http://schemas.openxmlformats.org/officeDocument/2006/relationships" xmlns:p="http://schemas.openxmlformats.org/presentationml/2006/main">
   <p:cSld>
     <p:spTree>
@@ -5123,6 +5039,39 @@
       </p:grpSpPr>
       <p:sp>
         <p:nvSpPr>
+          <p:cNvPr id="32" name="TextBox 31"/>
+          <p:cNvSpPr txBox="1"/>
+          <p:nvPr/>
+        </p:nvSpPr>
+        <p:spPr>
+          <a:xfrm>
+            <a:off x="5029200" y="895350"/>
+            <a:ext cx="928898" cy="369332"/>
+          </a:xfrm>
+          <a:prstGeom prst="rect">
+            <a:avLst/>
+          </a:prstGeom>
+          <a:noFill/>
+        </p:spPr>
+        <p:txBody>
+          <a:bodyPr wrap="none" rtlCol="0">
+            <a:spAutoFit/>
+          </a:bodyPr>
+          <a:lstStyle/>
+          <a:p>
+            <a:r>
+              <a:rPr lang="en-US" dirty="0">
+                <a:solidFill>
+                  <a:schemeClr val="bg1"/>
+                </a:solidFill>
+              </a:rPr>
+              <a:t>Zone B</a:t>
+            </a:r>
+          </a:p>
+        </p:txBody>
+      </p:sp>
+      <p:sp>
+        <p:nvSpPr>
           <p:cNvPr id="2" name="Title 1"/>
           <p:cNvSpPr>
             <a:spLocks noGrp="1"/>
@@ -5137,36 +5086,129 @@
           <a:lstStyle/>
           <a:p>
             <a:r>
-              <a:rPr lang="en-US" sz="2400" b="1" dirty="0"/>
-              <a:t>Master-only, Data-only, and Client-only Nodes</a:t>
-            </a:r>
+              <a:rPr lang="en-US" sz="2400" dirty="0"/>
+              <a:t>Dedicated Master Nodes</a:t>
+            </a:r>
+            <a:endParaRPr lang="en-US" sz="2400" i="1" dirty="0"/>
+          </a:p>
+        </p:txBody>
+      </p:sp>
+      <p:sp>
+        <p:nvSpPr>
+          <p:cNvPr id="43" name="TextBox 42">
+            <a:extLst>
+              <a:ext uri="{FF2B5EF4-FFF2-40B4-BE49-F238E27FC236}">
+                <a16:creationId xmlns:a16="http://schemas.microsoft.com/office/drawing/2014/main" id="{25978E83-09B5-1A42-94FA-67DE42E67DD1}"/>
+              </a:ext>
+            </a:extLst>
+          </p:cNvPr>
+          <p:cNvSpPr txBox="1"/>
+          <p:nvPr/>
+        </p:nvSpPr>
+        <p:spPr>
+          <a:xfrm>
+            <a:off x="6781800" y="4857750"/>
+            <a:ext cx="2101857" cy="276999"/>
+          </a:xfrm>
+          <a:prstGeom prst="rect">
+            <a:avLst/>
+          </a:prstGeom>
+          <a:noFill/>
+        </p:spPr>
+        <p:txBody>
+          <a:bodyPr wrap="none" rtlCol="0">
+            <a:spAutoFit/>
+          </a:bodyPr>
+          <a:lstStyle/>
+          <a:p>
+            <a:r>
+              <a:rPr lang="en-AU" sz="1200" dirty="0">
+                <a:solidFill>
+                  <a:schemeClr val="bg1">
+                    <a:lumMod val="75000"/>
+                  </a:schemeClr>
+                </a:solidFill>
+              </a:rPr>
+              <a:t>© copyright REA Group Ltd</a:t>
+            </a:r>
+            <a:endParaRPr lang="en-US" sz="1200" dirty="0">
+              <a:solidFill>
+                <a:schemeClr val="bg1">
+                  <a:lumMod val="75000"/>
+                </a:schemeClr>
+              </a:solidFill>
+            </a:endParaRPr>
           </a:p>
         </p:txBody>
       </p:sp>
       <p:grpSp>
         <p:nvGrpSpPr>
-          <p:cNvPr id="21" name="Group 20"/>
+          <p:cNvPr id="3" name="Group 2">
+            <a:extLst>
+              <a:ext uri="{FF2B5EF4-FFF2-40B4-BE49-F238E27FC236}">
+                <a16:creationId xmlns:a16="http://schemas.microsoft.com/office/drawing/2014/main" id="{2AB0A34C-E078-F344-90EB-CE9FC7442160}"/>
+              </a:ext>
+            </a:extLst>
+          </p:cNvPr>
           <p:cNvGrpSpPr/>
           <p:nvPr/>
         </p:nvGrpSpPr>
         <p:grpSpPr>
           <a:xfrm>
-            <a:off x="3962400" y="2419350"/>
-            <a:ext cx="1447800" cy="685800"/>
-            <a:chOff x="609600" y="1809750"/>
-            <a:chExt cx="1447800" cy="685800"/>
+            <a:off x="152400" y="895350"/>
+            <a:ext cx="2819400" cy="3581400"/>
+            <a:chOff x="152400" y="895350"/>
+            <a:chExt cx="2819400" cy="3581400"/>
           </a:xfrm>
         </p:grpSpPr>
         <p:sp>
           <p:nvSpPr>
-            <p:cNvPr id="24" name="Rounded Rectangle 23"/>
+            <p:cNvPr id="30" name="Rectangle 29"/>
             <p:cNvSpPr/>
             <p:nvPr/>
           </p:nvSpPr>
           <p:spPr>
             <a:xfrm>
-              <a:off x="609600" y="1809750"/>
-              <a:ext cx="1447800" cy="685800"/>
+              <a:off x="152400" y="895350"/>
+              <a:ext cx="2819400" cy="3581400"/>
+            </a:xfrm>
+            <a:prstGeom prst="rect">
+              <a:avLst/>
+            </a:prstGeom>
+          </p:spPr>
+          <p:style>
+            <a:lnRef idx="1">
+              <a:schemeClr val="accent1"/>
+            </a:lnRef>
+            <a:fillRef idx="3">
+              <a:schemeClr val="accent1"/>
+            </a:fillRef>
+            <a:effectRef idx="2">
+              <a:schemeClr val="accent1"/>
+            </a:effectRef>
+            <a:fontRef idx="minor">
+              <a:schemeClr val="lt1"/>
+            </a:fontRef>
+          </p:style>
+          <p:txBody>
+            <a:bodyPr rtlCol="0" anchor="ctr"/>
+            <a:lstStyle/>
+            <a:p>
+              <a:pPr algn="ctr"/>
+              <a:endParaRPr lang="en-US" dirty="0"/>
+            </a:p>
+          </p:txBody>
+        </p:sp>
+        <p:sp>
+          <p:nvSpPr>
+            <p:cNvPr id="4" name="Rounded Rectangle 3"/>
+            <p:cNvSpPr/>
+            <p:nvPr/>
+          </p:nvSpPr>
+          <p:spPr>
+            <a:xfrm>
+              <a:off x="381617" y="1417082"/>
+              <a:ext cx="1066800" cy="1295400"/>
             </a:xfrm>
             <a:prstGeom prst="roundRect">
               <a:avLst/>
@@ -5191,20 +5233,23 @@
             <a:lstStyle/>
             <a:p>
               <a:pPr algn="ctr"/>
-              <a:endParaRPr lang="en-US"/>
+              <a:r>
+                <a:rPr lang="en-US" dirty="0"/>
+                <a:t>Data Node</a:t>
+              </a:r>
             </a:p>
           </p:txBody>
         </p:sp>
         <p:sp>
           <p:nvSpPr>
-            <p:cNvPr id="28" name="TextBox 27"/>
+            <p:cNvPr id="45" name="TextBox 44"/>
             <p:cNvSpPr txBox="1"/>
             <p:nvPr/>
           </p:nvSpPr>
           <p:spPr>
             <a:xfrm>
-              <a:off x="762000" y="1962150"/>
-              <a:ext cx="1288221" cy="369332"/>
+              <a:off x="457200" y="895350"/>
+              <a:ext cx="915635" cy="369332"/>
             </a:xfrm>
             <a:prstGeom prst="rect">
               <a:avLst/>
@@ -5218,37 +5263,32 @@
             <a:lstStyle/>
             <a:p>
               <a:r>
-                <a:rPr lang="en-US" dirty="0"/>
-                <a:t>Data Node</a:t>
+                <a:rPr lang="en-US" dirty="0">
+                  <a:solidFill>
+                    <a:schemeClr val="bg1"/>
+                  </a:solidFill>
+                </a:rPr>
+                <a:t>Zone A</a:t>
               </a:r>
             </a:p>
           </p:txBody>
         </p:sp>
-      </p:grpSp>
-      <p:grpSp>
-        <p:nvGrpSpPr>
-          <p:cNvPr id="29" name="Group 28"/>
-          <p:cNvGrpSpPr/>
-          <p:nvPr/>
-        </p:nvGrpSpPr>
-        <p:grpSpPr>
-          <a:xfrm>
-            <a:off x="2286000" y="2419350"/>
-            <a:ext cx="1447800" cy="685800"/>
-            <a:chOff x="609600" y="1809750"/>
-            <a:chExt cx="1447800" cy="685800"/>
-          </a:xfrm>
-        </p:grpSpPr>
         <p:sp>
           <p:nvSpPr>
-            <p:cNvPr id="30" name="Rounded Rectangle 29"/>
+            <p:cNvPr id="42" name="Rounded Rectangle 41">
+              <a:extLst>
+                <a:ext uri="{FF2B5EF4-FFF2-40B4-BE49-F238E27FC236}">
+                  <a16:creationId xmlns:a16="http://schemas.microsoft.com/office/drawing/2014/main" id="{CE6390D4-A9EC-464C-A82E-EBCF5A5C2AE4}"/>
+                </a:ext>
+              </a:extLst>
+            </p:cNvPr>
             <p:cNvSpPr/>
             <p:nvPr/>
           </p:nvSpPr>
           <p:spPr>
             <a:xfrm>
-              <a:off x="609600" y="1809750"/>
-              <a:ext cx="1447800" cy="685800"/>
+              <a:off x="1562717" y="1417082"/>
+              <a:ext cx="1066800" cy="1295400"/>
             </a:xfrm>
             <a:prstGeom prst="roundRect">
               <a:avLst/>
@@ -5273,20 +5313,213 @@
             <a:lstStyle/>
             <a:p>
               <a:pPr algn="ctr"/>
-              <a:endParaRPr lang="en-US"/>
+              <a:r>
+                <a:rPr lang="en-US" dirty="0"/>
+                <a:t>Data Node</a:t>
+              </a:r>
             </a:p>
           </p:txBody>
         </p:sp>
         <p:sp>
           <p:nvSpPr>
-            <p:cNvPr id="31" name="TextBox 30"/>
+            <p:cNvPr id="49" name="Rounded Rectangle 48">
+              <a:extLst>
+                <a:ext uri="{FF2B5EF4-FFF2-40B4-BE49-F238E27FC236}">
+                  <a16:creationId xmlns:a16="http://schemas.microsoft.com/office/drawing/2014/main" id="{0C5AB1C5-086D-6440-87F8-BEDFA4DF9A64}"/>
+                </a:ext>
+              </a:extLst>
+            </p:cNvPr>
+            <p:cNvSpPr/>
+            <p:nvPr/>
+          </p:nvSpPr>
+          <p:spPr>
+            <a:xfrm>
+              <a:off x="1372835" y="3028950"/>
+              <a:ext cx="1066800" cy="1295400"/>
+            </a:xfrm>
+            <a:prstGeom prst="roundRect">
+              <a:avLst/>
+            </a:prstGeom>
+            <a:gradFill flip="none" rotWithShape="1">
+              <a:gsLst>
+                <a:gs pos="0">
+                  <a:schemeClr val="accent3">
+                    <a:lumMod val="40000"/>
+                    <a:lumOff val="60000"/>
+                  </a:schemeClr>
+                </a:gs>
+                <a:gs pos="46000">
+                  <a:schemeClr val="accent3">
+                    <a:lumMod val="95000"/>
+                    <a:lumOff val="5000"/>
+                  </a:schemeClr>
+                </a:gs>
+                <a:gs pos="100000">
+                  <a:schemeClr val="accent3">
+                    <a:lumMod val="60000"/>
+                  </a:schemeClr>
+                </a:gs>
+              </a:gsLst>
+              <a:path path="circle">
+                <a:fillToRect l="50000" t="130000" r="50000" b="-30000"/>
+              </a:path>
+              <a:tileRect/>
+            </a:gradFill>
+          </p:spPr>
+          <p:style>
+            <a:lnRef idx="0">
+              <a:schemeClr val="accent2"/>
+            </a:lnRef>
+            <a:fillRef idx="3">
+              <a:schemeClr val="accent2"/>
+            </a:fillRef>
+            <a:effectRef idx="3">
+              <a:schemeClr val="accent2"/>
+            </a:effectRef>
+            <a:fontRef idx="minor">
+              <a:schemeClr val="lt1"/>
+            </a:fontRef>
+          </p:style>
+          <p:txBody>
+            <a:bodyPr rtlCol="0" anchor="ctr"/>
+            <a:lstStyle/>
+            <a:p>
+              <a:pPr algn="ctr"/>
+              <a:r>
+                <a:rPr lang="en-US" dirty="0"/>
+                <a:t>Master Eligible</a:t>
+              </a:r>
+            </a:p>
+          </p:txBody>
+        </p:sp>
+      </p:grpSp>
+      <p:grpSp>
+        <p:nvGrpSpPr>
+          <p:cNvPr id="50" name="Group 49">
+            <a:extLst>
+              <a:ext uri="{FF2B5EF4-FFF2-40B4-BE49-F238E27FC236}">
+                <a16:creationId xmlns:a16="http://schemas.microsoft.com/office/drawing/2014/main" id="{031DA564-D51B-A743-8DF7-7B8947416713}"/>
+              </a:ext>
+            </a:extLst>
+          </p:cNvPr>
+          <p:cNvGrpSpPr/>
+          <p:nvPr/>
+        </p:nvGrpSpPr>
+        <p:grpSpPr>
+          <a:xfrm>
+            <a:off x="3138698" y="921782"/>
+            <a:ext cx="2819400" cy="3581400"/>
+            <a:chOff x="152400" y="895350"/>
+            <a:chExt cx="2819400" cy="3581400"/>
+          </a:xfrm>
+        </p:grpSpPr>
+        <p:sp>
+          <p:nvSpPr>
+            <p:cNvPr id="51" name="Rectangle 50">
+              <a:extLst>
+                <a:ext uri="{FF2B5EF4-FFF2-40B4-BE49-F238E27FC236}">
+                  <a16:creationId xmlns:a16="http://schemas.microsoft.com/office/drawing/2014/main" id="{A8219EAA-BFEB-2B41-91A6-F0578C176D73}"/>
+                </a:ext>
+              </a:extLst>
+            </p:cNvPr>
+            <p:cNvSpPr/>
+            <p:nvPr/>
+          </p:nvSpPr>
+          <p:spPr>
+            <a:xfrm>
+              <a:off x="152400" y="895350"/>
+              <a:ext cx="2819400" cy="3581400"/>
+            </a:xfrm>
+            <a:prstGeom prst="rect">
+              <a:avLst/>
+            </a:prstGeom>
+          </p:spPr>
+          <p:style>
+            <a:lnRef idx="1">
+              <a:schemeClr val="accent1"/>
+            </a:lnRef>
+            <a:fillRef idx="3">
+              <a:schemeClr val="accent1"/>
+            </a:fillRef>
+            <a:effectRef idx="2">
+              <a:schemeClr val="accent1"/>
+            </a:effectRef>
+            <a:fontRef idx="minor">
+              <a:schemeClr val="lt1"/>
+            </a:fontRef>
+          </p:style>
+          <p:txBody>
+            <a:bodyPr rtlCol="0" anchor="ctr"/>
+            <a:lstStyle/>
+            <a:p>
+              <a:pPr algn="ctr"/>
+              <a:endParaRPr lang="en-US" dirty="0"/>
+            </a:p>
+          </p:txBody>
+        </p:sp>
+        <p:sp>
+          <p:nvSpPr>
+            <p:cNvPr id="52" name="Rounded Rectangle 51">
+              <a:extLst>
+                <a:ext uri="{FF2B5EF4-FFF2-40B4-BE49-F238E27FC236}">
+                  <a16:creationId xmlns:a16="http://schemas.microsoft.com/office/drawing/2014/main" id="{51791E64-3C9C-774A-AA08-080E22AF278B}"/>
+                </a:ext>
+              </a:extLst>
+            </p:cNvPr>
+            <p:cNvSpPr/>
+            <p:nvPr/>
+          </p:nvSpPr>
+          <p:spPr>
+            <a:xfrm>
+              <a:off x="381617" y="1417082"/>
+              <a:ext cx="1066800" cy="1295400"/>
+            </a:xfrm>
+            <a:prstGeom prst="roundRect">
+              <a:avLst/>
+            </a:prstGeom>
+          </p:spPr>
+          <p:style>
+            <a:lnRef idx="0">
+              <a:schemeClr val="accent2"/>
+            </a:lnRef>
+            <a:fillRef idx="3">
+              <a:schemeClr val="accent2"/>
+            </a:fillRef>
+            <a:effectRef idx="3">
+              <a:schemeClr val="accent2"/>
+            </a:effectRef>
+            <a:fontRef idx="minor">
+              <a:schemeClr val="lt1"/>
+            </a:fontRef>
+          </p:style>
+          <p:txBody>
+            <a:bodyPr rtlCol="0" anchor="ctr"/>
+            <a:lstStyle/>
+            <a:p>
+              <a:pPr algn="ctr"/>
+              <a:r>
+                <a:rPr lang="en-US" dirty="0"/>
+                <a:t>Data Node</a:t>
+              </a:r>
+            </a:p>
+          </p:txBody>
+        </p:sp>
+        <p:sp>
+          <p:nvSpPr>
+            <p:cNvPr id="53" name="TextBox 52">
+              <a:extLst>
+                <a:ext uri="{FF2B5EF4-FFF2-40B4-BE49-F238E27FC236}">
+                  <a16:creationId xmlns:a16="http://schemas.microsoft.com/office/drawing/2014/main" id="{99DDDAD7-3620-EA44-A46D-01384939C422}"/>
+                </a:ext>
+              </a:extLst>
+            </p:cNvPr>
             <p:cNvSpPr txBox="1"/>
             <p:nvPr/>
           </p:nvSpPr>
           <p:spPr>
             <a:xfrm>
-              <a:off x="762000" y="1962150"/>
-              <a:ext cx="1288221" cy="369332"/>
+              <a:off x="457200" y="895350"/>
+              <a:ext cx="938077" cy="369332"/>
             </a:xfrm>
             <a:prstGeom prst="rect">
               <a:avLst/>
@@ -5300,339 +5533,410 @@
             <a:lstStyle/>
             <a:p>
               <a:r>
+                <a:rPr lang="en-US" dirty="0">
+                  <a:solidFill>
+                    <a:schemeClr val="bg1"/>
+                  </a:solidFill>
+                </a:rPr>
+                <a:t>Zone B</a:t>
+              </a:r>
+            </a:p>
+          </p:txBody>
+        </p:sp>
+        <p:sp>
+          <p:nvSpPr>
+            <p:cNvPr id="54" name="Rounded Rectangle 53">
+              <a:extLst>
+                <a:ext uri="{FF2B5EF4-FFF2-40B4-BE49-F238E27FC236}">
+                  <a16:creationId xmlns:a16="http://schemas.microsoft.com/office/drawing/2014/main" id="{DDCFF8EF-BFE1-3849-8352-02F42FDB3414}"/>
+                </a:ext>
+              </a:extLst>
+            </p:cNvPr>
+            <p:cNvSpPr/>
+            <p:nvPr/>
+          </p:nvSpPr>
+          <p:spPr>
+            <a:xfrm>
+              <a:off x="1562717" y="1417082"/>
+              <a:ext cx="1066800" cy="1295400"/>
+            </a:xfrm>
+            <a:prstGeom prst="roundRect">
+              <a:avLst/>
+            </a:prstGeom>
+          </p:spPr>
+          <p:style>
+            <a:lnRef idx="0">
+              <a:schemeClr val="accent2"/>
+            </a:lnRef>
+            <a:fillRef idx="3">
+              <a:schemeClr val="accent2"/>
+            </a:fillRef>
+            <a:effectRef idx="3">
+              <a:schemeClr val="accent2"/>
+            </a:effectRef>
+            <a:fontRef idx="minor">
+              <a:schemeClr val="lt1"/>
+            </a:fontRef>
+          </p:style>
+          <p:txBody>
+            <a:bodyPr rtlCol="0" anchor="ctr"/>
+            <a:lstStyle/>
+            <a:p>
+              <a:pPr algn="ctr"/>
+              <a:r>
                 <a:rPr lang="en-US" dirty="0"/>
                 <a:t>Data Node</a:t>
               </a:r>
             </a:p>
           </p:txBody>
         </p:sp>
+        <p:sp>
+          <p:nvSpPr>
+            <p:cNvPr id="55" name="Rounded Rectangle 54">
+              <a:extLst>
+                <a:ext uri="{FF2B5EF4-FFF2-40B4-BE49-F238E27FC236}">
+                  <a16:creationId xmlns:a16="http://schemas.microsoft.com/office/drawing/2014/main" id="{E0D85805-726B-AE47-B147-48B695EDE89E}"/>
+                </a:ext>
+              </a:extLst>
+            </p:cNvPr>
+            <p:cNvSpPr/>
+            <p:nvPr/>
+          </p:nvSpPr>
+          <p:spPr>
+            <a:xfrm>
+              <a:off x="1372835" y="3028950"/>
+              <a:ext cx="1066800" cy="1295400"/>
+            </a:xfrm>
+            <a:prstGeom prst="roundRect">
+              <a:avLst/>
+            </a:prstGeom>
+            <a:gradFill flip="none" rotWithShape="1">
+              <a:gsLst>
+                <a:gs pos="0">
+                  <a:schemeClr val="accent4">
+                    <a:lumMod val="40000"/>
+                    <a:lumOff val="60000"/>
+                  </a:schemeClr>
+                </a:gs>
+                <a:gs pos="46000">
+                  <a:schemeClr val="accent4">
+                    <a:lumMod val="95000"/>
+                    <a:lumOff val="5000"/>
+                  </a:schemeClr>
+                </a:gs>
+                <a:gs pos="100000">
+                  <a:schemeClr val="accent4">
+                    <a:lumMod val="60000"/>
+                  </a:schemeClr>
+                </a:gs>
+              </a:gsLst>
+              <a:path path="circle">
+                <a:fillToRect l="50000" t="130000" r="50000" b="-30000"/>
+              </a:path>
+              <a:tileRect/>
+            </a:gradFill>
+          </p:spPr>
+          <p:style>
+            <a:lnRef idx="0">
+              <a:schemeClr val="accent2"/>
+            </a:lnRef>
+            <a:fillRef idx="3">
+              <a:schemeClr val="accent2"/>
+            </a:fillRef>
+            <a:effectRef idx="3">
+              <a:schemeClr val="accent2"/>
+            </a:effectRef>
+            <a:fontRef idx="minor">
+              <a:schemeClr val="lt1"/>
+            </a:fontRef>
+          </p:style>
+          <p:txBody>
+            <a:bodyPr rtlCol="0" anchor="ctr"/>
+            <a:lstStyle/>
+            <a:p>
+              <a:pPr algn="ctr"/>
+              <a:r>
+                <a:rPr lang="en-US" dirty="0"/>
+                <a:t>Master</a:t>
+              </a:r>
+            </a:p>
+          </p:txBody>
+        </p:sp>
       </p:grpSp>
-      <p:sp>
-        <p:nvSpPr>
-          <p:cNvPr id="4" name="Rectangle 3"/>
-          <p:cNvSpPr/>
-          <p:nvPr/>
-        </p:nvSpPr>
-        <p:spPr>
-          <a:xfrm>
-            <a:off x="2743200" y="3333750"/>
-            <a:ext cx="1752600" cy="381000"/>
-          </a:xfrm>
-          <a:prstGeom prst="rect">
-            <a:avLst/>
-          </a:prstGeom>
-          <a:solidFill>
-            <a:schemeClr val="accent5"/>
-          </a:solidFill>
-          <a:ln>
-            <a:solidFill>
-              <a:schemeClr val="accent5"/>
-            </a:solidFill>
-          </a:ln>
-        </p:spPr>
-        <p:style>
-          <a:lnRef idx="1">
-            <a:schemeClr val="accent4"/>
-          </a:lnRef>
-          <a:fillRef idx="3">
-            <a:schemeClr val="accent4"/>
-          </a:fillRef>
-          <a:effectRef idx="2">
-            <a:schemeClr val="accent4"/>
-          </a:effectRef>
-          <a:fontRef idx="minor">
-            <a:schemeClr val="lt1"/>
-          </a:fontRef>
-        </p:style>
-        <p:txBody>
-          <a:bodyPr rtlCol="0" anchor="ctr"/>
-          <a:lstStyle/>
-          <a:p>
-            <a:pPr algn="ctr"/>
-            <a:r>
-              <a:rPr lang="en-US" dirty="0">
-                <a:solidFill>
-                  <a:schemeClr val="tx1"/>
-                </a:solidFill>
-              </a:rPr>
-              <a:t>Master Eligible</a:t>
-            </a:r>
-          </a:p>
-        </p:txBody>
-      </p:sp>
-      <p:sp>
-        <p:nvSpPr>
-          <p:cNvPr id="10" name="Rounded Rectangle 9"/>
-          <p:cNvSpPr/>
-          <p:nvPr/>
-        </p:nvSpPr>
-        <p:spPr>
-          <a:xfrm>
-            <a:off x="3048000" y="1428750"/>
-            <a:ext cx="2057400" cy="533400"/>
-          </a:xfrm>
-          <a:prstGeom prst="roundRect">
-            <a:avLst/>
-          </a:prstGeom>
-          <a:solidFill>
-            <a:schemeClr val="accent4"/>
-          </a:solidFill>
-        </p:spPr>
-        <p:style>
-          <a:lnRef idx="1">
-            <a:schemeClr val="accent5"/>
-          </a:lnRef>
-          <a:fillRef idx="3">
-            <a:schemeClr val="accent5"/>
-          </a:fillRef>
-          <a:effectRef idx="2">
-            <a:schemeClr val="accent5"/>
-          </a:effectRef>
-          <a:fontRef idx="minor">
-            <a:schemeClr val="lt1"/>
-          </a:fontRef>
-        </p:style>
-        <p:txBody>
-          <a:bodyPr rtlCol="0" anchor="ctr"/>
-          <a:lstStyle/>
-          <a:p>
-            <a:pPr algn="ctr"/>
-            <a:r>
-              <a:rPr lang="en-US" dirty="0"/>
-              <a:t>Client-only Node</a:t>
-            </a:r>
-          </a:p>
-        </p:txBody>
-      </p:sp>
-      <p:cxnSp>
-        <p:nvCxnSpPr>
-          <p:cNvPr id="13" name="Straight Arrow Connector 12"/>
-          <p:cNvCxnSpPr>
-            <a:stCxn id="10" idx="2"/>
-          </p:cNvCxnSpPr>
-          <p:nvPr/>
-        </p:nvCxnSpPr>
-        <p:spPr>
-          <a:xfrm flipH="1">
-            <a:off x="3124200" y="1962150"/>
-            <a:ext cx="952500" cy="457200"/>
-          </a:xfrm>
-          <a:prstGeom prst="straightConnector1">
-            <a:avLst/>
-          </a:prstGeom>
-          <a:ln>
-            <a:tailEnd type="arrow"/>
-          </a:ln>
-        </p:spPr>
-        <p:style>
-          <a:lnRef idx="2">
-            <a:schemeClr val="dk1"/>
-          </a:lnRef>
-          <a:fillRef idx="0">
-            <a:schemeClr val="dk1"/>
-          </a:fillRef>
-          <a:effectRef idx="1">
-            <a:schemeClr val="dk1"/>
-          </a:effectRef>
-          <a:fontRef idx="minor">
-            <a:schemeClr val="tx1"/>
-          </a:fontRef>
-        </p:style>
-      </p:cxnSp>
-      <p:cxnSp>
-        <p:nvCxnSpPr>
-          <p:cNvPr id="39" name="Straight Arrow Connector 38"/>
-          <p:cNvCxnSpPr>
-            <a:endCxn id="24" idx="0"/>
-          </p:cNvCxnSpPr>
-          <p:nvPr/>
-        </p:nvCxnSpPr>
-        <p:spPr>
-          <a:xfrm>
-            <a:off x="4038600" y="1962150"/>
-            <a:ext cx="647700" cy="457200"/>
-          </a:xfrm>
-          <a:prstGeom prst="straightConnector1">
-            <a:avLst/>
-          </a:prstGeom>
-          <a:ln>
-            <a:tailEnd type="arrow"/>
-          </a:ln>
-        </p:spPr>
-        <p:style>
-          <a:lnRef idx="2">
-            <a:schemeClr val="dk1"/>
-          </a:lnRef>
-          <a:fillRef idx="0">
-            <a:schemeClr val="dk1"/>
-          </a:fillRef>
-          <a:effectRef idx="1">
-            <a:schemeClr val="dk1"/>
-          </a:effectRef>
-          <a:fontRef idx="minor">
-            <a:schemeClr val="tx1"/>
-          </a:fontRef>
-        </p:style>
-      </p:cxnSp>
-      <p:sp>
-        <p:nvSpPr>
-          <p:cNvPr id="33" name="Rectangle 32"/>
-          <p:cNvSpPr/>
-          <p:nvPr/>
-        </p:nvSpPr>
-        <p:spPr>
-          <a:xfrm>
-            <a:off x="3733800" y="3867150"/>
-            <a:ext cx="1752600" cy="381000"/>
-          </a:xfrm>
-          <a:prstGeom prst="rect">
-            <a:avLst/>
-          </a:prstGeom>
-          <a:solidFill>
-            <a:schemeClr val="accent5"/>
-          </a:solidFill>
-          <a:ln>
-            <a:solidFill>
-              <a:schemeClr val="tx1"/>
-            </a:solidFill>
-            <a:prstDash val="lgDash"/>
-          </a:ln>
-        </p:spPr>
-        <p:style>
-          <a:lnRef idx="1">
-            <a:schemeClr val="accent4"/>
-          </a:lnRef>
-          <a:fillRef idx="3">
-            <a:schemeClr val="accent4"/>
-          </a:fillRef>
-          <a:effectRef idx="2">
-            <a:schemeClr val="accent4"/>
-          </a:effectRef>
-          <a:fontRef idx="minor">
-            <a:schemeClr val="lt1"/>
-          </a:fontRef>
-        </p:style>
-        <p:txBody>
-          <a:bodyPr rtlCol="0" anchor="ctr"/>
-          <a:lstStyle/>
-          <a:p>
-            <a:pPr algn="ctr"/>
-            <a:r>
-              <a:rPr lang="en-US" dirty="0">
-                <a:solidFill>
-                  <a:schemeClr val="tx1"/>
-                </a:solidFill>
-              </a:rPr>
-              <a:t>Master</a:t>
-            </a:r>
-          </a:p>
-        </p:txBody>
-      </p:sp>
-      <p:sp>
-        <p:nvSpPr>
-          <p:cNvPr id="40" name="Rectangle 39"/>
-          <p:cNvSpPr/>
-          <p:nvPr/>
-        </p:nvSpPr>
-        <p:spPr>
-          <a:xfrm>
-            <a:off x="4648200" y="3181350"/>
-            <a:ext cx="1752600" cy="381000"/>
-          </a:xfrm>
-          <a:prstGeom prst="rect">
-            <a:avLst/>
-          </a:prstGeom>
-          <a:solidFill>
-            <a:schemeClr val="accent5"/>
-          </a:solidFill>
-          <a:ln>
-            <a:solidFill>
-              <a:schemeClr val="accent5"/>
-            </a:solidFill>
-          </a:ln>
-        </p:spPr>
-        <p:style>
-          <a:lnRef idx="1">
-            <a:schemeClr val="accent4"/>
-          </a:lnRef>
-          <a:fillRef idx="3">
-            <a:schemeClr val="accent4"/>
-          </a:fillRef>
-          <a:effectRef idx="2">
-            <a:schemeClr val="accent4"/>
-          </a:effectRef>
-          <a:fontRef idx="minor">
-            <a:schemeClr val="lt1"/>
-          </a:fontRef>
-        </p:style>
-        <p:txBody>
-          <a:bodyPr rtlCol="0" anchor="ctr"/>
-          <a:lstStyle/>
-          <a:p>
-            <a:pPr algn="ctr"/>
-            <a:r>
-              <a:rPr lang="en-US" dirty="0">
-                <a:solidFill>
-                  <a:schemeClr val="tx1"/>
-                </a:solidFill>
-              </a:rPr>
-              <a:t>Master Eligible</a:t>
-            </a:r>
-          </a:p>
-        </p:txBody>
-      </p:sp>
-      <p:sp>
-        <p:nvSpPr>
-          <p:cNvPr id="15" name="TextBox 14">
+      <p:grpSp>
+        <p:nvGrpSpPr>
+          <p:cNvPr id="56" name="Group 55">
             <a:extLst>
               <a:ext uri="{FF2B5EF4-FFF2-40B4-BE49-F238E27FC236}">
-                <a16:creationId xmlns:a16="http://schemas.microsoft.com/office/drawing/2014/main" id="{A9504D52-399D-924E-A5A7-1750E2C8051B}"/>
+                <a16:creationId xmlns:a16="http://schemas.microsoft.com/office/drawing/2014/main" id="{99EDDAD9-F9A1-2E45-97EA-101DC8A85C82}"/>
               </a:ext>
             </a:extLst>
           </p:cNvPr>
-          <p:cNvSpPr txBox="1"/>
+          <p:cNvGrpSpPr/>
           <p:nvPr/>
-        </p:nvSpPr>
-        <p:spPr>
-          <a:xfrm>
-            <a:off x="6873871" y="4705350"/>
-            <a:ext cx="2101857" cy="276999"/>
-          </a:xfrm>
-          <a:prstGeom prst="rect">
-            <a:avLst/>
-          </a:prstGeom>
-          <a:noFill/>
-        </p:spPr>
-        <p:txBody>
-          <a:bodyPr wrap="none" rtlCol="0">
-            <a:spAutoFit/>
-          </a:bodyPr>
-          <a:lstStyle/>
-          <a:p>
-            <a:r>
-              <a:rPr lang="en-AU" sz="1200" dirty="0">
-                <a:solidFill>
-                  <a:schemeClr val="bg1">
-                    <a:lumMod val="75000"/>
+        </p:nvGrpSpPr>
+        <p:grpSpPr>
+          <a:xfrm>
+            <a:off x="6187315" y="921782"/>
+            <a:ext cx="2819400" cy="3581400"/>
+            <a:chOff x="152400" y="895350"/>
+            <a:chExt cx="2819400" cy="3581400"/>
+          </a:xfrm>
+        </p:grpSpPr>
+        <p:sp>
+          <p:nvSpPr>
+            <p:cNvPr id="57" name="Rectangle 56">
+              <a:extLst>
+                <a:ext uri="{FF2B5EF4-FFF2-40B4-BE49-F238E27FC236}">
+                  <a16:creationId xmlns:a16="http://schemas.microsoft.com/office/drawing/2014/main" id="{44CA9397-950F-454A-AF2A-58190FA16CE8}"/>
+                </a:ext>
+              </a:extLst>
+            </p:cNvPr>
+            <p:cNvSpPr/>
+            <p:nvPr/>
+          </p:nvSpPr>
+          <p:spPr>
+            <a:xfrm>
+              <a:off x="152400" y="895350"/>
+              <a:ext cx="2819400" cy="3581400"/>
+            </a:xfrm>
+            <a:prstGeom prst="rect">
+              <a:avLst/>
+            </a:prstGeom>
+          </p:spPr>
+          <p:style>
+            <a:lnRef idx="1">
+              <a:schemeClr val="accent1"/>
+            </a:lnRef>
+            <a:fillRef idx="3">
+              <a:schemeClr val="accent1"/>
+            </a:fillRef>
+            <a:effectRef idx="2">
+              <a:schemeClr val="accent1"/>
+            </a:effectRef>
+            <a:fontRef idx="minor">
+              <a:schemeClr val="lt1"/>
+            </a:fontRef>
+          </p:style>
+          <p:txBody>
+            <a:bodyPr rtlCol="0" anchor="ctr"/>
+            <a:lstStyle/>
+            <a:p>
+              <a:pPr algn="ctr"/>
+              <a:endParaRPr lang="en-US" dirty="0"/>
+            </a:p>
+          </p:txBody>
+        </p:sp>
+        <p:sp>
+          <p:nvSpPr>
+            <p:cNvPr id="58" name="Rounded Rectangle 57">
+              <a:extLst>
+                <a:ext uri="{FF2B5EF4-FFF2-40B4-BE49-F238E27FC236}">
+                  <a16:creationId xmlns:a16="http://schemas.microsoft.com/office/drawing/2014/main" id="{3435A2AF-1A09-BC45-B16D-926C7F77DEFA}"/>
+                </a:ext>
+              </a:extLst>
+            </p:cNvPr>
+            <p:cNvSpPr/>
+            <p:nvPr/>
+          </p:nvSpPr>
+          <p:spPr>
+            <a:xfrm>
+              <a:off x="381617" y="1417082"/>
+              <a:ext cx="1066800" cy="1295400"/>
+            </a:xfrm>
+            <a:prstGeom prst="roundRect">
+              <a:avLst/>
+            </a:prstGeom>
+          </p:spPr>
+          <p:style>
+            <a:lnRef idx="0">
+              <a:schemeClr val="accent2"/>
+            </a:lnRef>
+            <a:fillRef idx="3">
+              <a:schemeClr val="accent2"/>
+            </a:fillRef>
+            <a:effectRef idx="3">
+              <a:schemeClr val="accent2"/>
+            </a:effectRef>
+            <a:fontRef idx="minor">
+              <a:schemeClr val="lt1"/>
+            </a:fontRef>
+          </p:style>
+          <p:txBody>
+            <a:bodyPr rtlCol="0" anchor="ctr"/>
+            <a:lstStyle/>
+            <a:p>
+              <a:pPr algn="ctr"/>
+              <a:r>
+                <a:rPr lang="en-US" dirty="0"/>
+                <a:t>Data Node</a:t>
+              </a:r>
+            </a:p>
+          </p:txBody>
+        </p:sp>
+        <p:sp>
+          <p:nvSpPr>
+            <p:cNvPr id="59" name="TextBox 58">
+              <a:extLst>
+                <a:ext uri="{FF2B5EF4-FFF2-40B4-BE49-F238E27FC236}">
+                  <a16:creationId xmlns:a16="http://schemas.microsoft.com/office/drawing/2014/main" id="{BEE1F545-056F-0F4C-BC0C-752320FF76B6}"/>
+                </a:ext>
+              </a:extLst>
+            </p:cNvPr>
+            <p:cNvSpPr txBox="1"/>
+            <p:nvPr/>
+          </p:nvSpPr>
+          <p:spPr>
+            <a:xfrm>
+              <a:off x="457200" y="895350"/>
+              <a:ext cx="962123" cy="369332"/>
+            </a:xfrm>
+            <a:prstGeom prst="rect">
+              <a:avLst/>
+            </a:prstGeom>
+            <a:noFill/>
+          </p:spPr>
+          <p:txBody>
+            <a:bodyPr wrap="none" rtlCol="0">
+              <a:spAutoFit/>
+            </a:bodyPr>
+            <a:lstStyle/>
+            <a:p>
+              <a:r>
+                <a:rPr lang="en-US" dirty="0">
+                  <a:solidFill>
+                    <a:schemeClr val="bg1"/>
+                  </a:solidFill>
+                </a:rPr>
+                <a:t>Zone C</a:t>
+              </a:r>
+            </a:p>
+          </p:txBody>
+        </p:sp>
+        <p:sp>
+          <p:nvSpPr>
+            <p:cNvPr id="60" name="Rounded Rectangle 59">
+              <a:extLst>
+                <a:ext uri="{FF2B5EF4-FFF2-40B4-BE49-F238E27FC236}">
+                  <a16:creationId xmlns:a16="http://schemas.microsoft.com/office/drawing/2014/main" id="{AE1E60C6-6DEC-344F-A430-5F9D84FB08A7}"/>
+                </a:ext>
+              </a:extLst>
+            </p:cNvPr>
+            <p:cNvSpPr/>
+            <p:nvPr/>
+          </p:nvSpPr>
+          <p:spPr>
+            <a:xfrm>
+              <a:off x="1562717" y="1417082"/>
+              <a:ext cx="1066800" cy="1295400"/>
+            </a:xfrm>
+            <a:prstGeom prst="roundRect">
+              <a:avLst/>
+            </a:prstGeom>
+          </p:spPr>
+          <p:style>
+            <a:lnRef idx="0">
+              <a:schemeClr val="accent2"/>
+            </a:lnRef>
+            <a:fillRef idx="3">
+              <a:schemeClr val="accent2"/>
+            </a:fillRef>
+            <a:effectRef idx="3">
+              <a:schemeClr val="accent2"/>
+            </a:effectRef>
+            <a:fontRef idx="minor">
+              <a:schemeClr val="lt1"/>
+            </a:fontRef>
+          </p:style>
+          <p:txBody>
+            <a:bodyPr rtlCol="0" anchor="ctr"/>
+            <a:lstStyle/>
+            <a:p>
+              <a:pPr algn="ctr"/>
+              <a:r>
+                <a:rPr lang="en-US" dirty="0"/>
+                <a:t>Data Node</a:t>
+              </a:r>
+            </a:p>
+          </p:txBody>
+        </p:sp>
+        <p:sp>
+          <p:nvSpPr>
+            <p:cNvPr id="61" name="Rounded Rectangle 60">
+              <a:extLst>
+                <a:ext uri="{FF2B5EF4-FFF2-40B4-BE49-F238E27FC236}">
+                  <a16:creationId xmlns:a16="http://schemas.microsoft.com/office/drawing/2014/main" id="{A651FFAD-407E-AA41-B6AC-F2CF57D78E71}"/>
+                </a:ext>
+              </a:extLst>
+            </p:cNvPr>
+            <p:cNvSpPr/>
+            <p:nvPr/>
+          </p:nvSpPr>
+          <p:spPr>
+            <a:xfrm>
+              <a:off x="1372835" y="3028950"/>
+              <a:ext cx="1066800" cy="1295400"/>
+            </a:xfrm>
+            <a:prstGeom prst="roundRect">
+              <a:avLst/>
+            </a:prstGeom>
+            <a:gradFill flip="none" rotWithShape="1">
+              <a:gsLst>
+                <a:gs pos="0">
+                  <a:schemeClr val="accent3">
+                    <a:lumMod val="40000"/>
+                    <a:lumOff val="60000"/>
                   </a:schemeClr>
-                </a:solidFill>
-              </a:rPr>
-              <a:t>© copyright REA Group Ltd</a:t>
-            </a:r>
-            <a:endParaRPr lang="en-US" sz="1200" dirty="0">
-              <a:solidFill>
-                <a:schemeClr val="bg1">
-                  <a:lumMod val="75000"/>
-                </a:schemeClr>
-              </a:solidFill>
-            </a:endParaRPr>
-          </a:p>
-        </p:txBody>
-      </p:sp>
+                </a:gs>
+                <a:gs pos="46000">
+                  <a:schemeClr val="accent3">
+                    <a:lumMod val="95000"/>
+                    <a:lumOff val="5000"/>
+                  </a:schemeClr>
+                </a:gs>
+                <a:gs pos="100000">
+                  <a:schemeClr val="accent3">
+                    <a:lumMod val="60000"/>
+                  </a:schemeClr>
+                </a:gs>
+              </a:gsLst>
+              <a:path path="circle">
+                <a:fillToRect l="50000" t="130000" r="50000" b="-30000"/>
+              </a:path>
+              <a:tileRect/>
+            </a:gradFill>
+          </p:spPr>
+          <p:style>
+            <a:lnRef idx="0">
+              <a:schemeClr val="accent2"/>
+            </a:lnRef>
+            <a:fillRef idx="3">
+              <a:schemeClr val="accent2"/>
+            </a:fillRef>
+            <a:effectRef idx="3">
+              <a:schemeClr val="accent2"/>
+            </a:effectRef>
+            <a:fontRef idx="minor">
+              <a:schemeClr val="lt1"/>
+            </a:fontRef>
+          </p:style>
+          <p:txBody>
+            <a:bodyPr rtlCol="0" anchor="ctr"/>
+            <a:lstStyle/>
+            <a:p>
+              <a:pPr algn="ctr"/>
+              <a:r>
+                <a:rPr lang="en-US" dirty="0"/>
+                <a:t>Master Eligible</a:t>
+              </a:r>
+            </a:p>
+          </p:txBody>
+        </p:sp>
+      </p:grpSp>
     </p:spTree>
     <p:extLst>
       <p:ext uri="{BB962C8B-B14F-4D97-AF65-F5344CB8AC3E}">
-        <p14:creationId xmlns:p14="http://schemas.microsoft.com/office/powerpoint/2010/main" val="1667230717"/>
+        <p14:creationId xmlns:p14="http://schemas.microsoft.com/office/powerpoint/2010/main" val="282925415"/>
       </p:ext>
     </p:extLst>
   </p:cSld>

</xml_diff>

<commit_message>
Minor update to the presentation
</commit_message>
<xml_diff>
--- a/ElasticsearchOps.pptx
+++ b/ElasticsearchOps.pptx
@@ -5,7 +5,7 @@
     <p:sldMasterId id="2147483648" r:id="rId1"/>
   </p:sldMasterIdLst>
   <p:notesMasterIdLst>
-    <p:notesMasterId r:id="rId24"/>
+    <p:notesMasterId r:id="rId25"/>
   </p:notesMasterIdLst>
   <p:sldIdLst>
     <p:sldId id="256" r:id="rId2"/>
@@ -21,15 +21,16 @@
     <p:sldId id="283" r:id="rId12"/>
     <p:sldId id="302" r:id="rId13"/>
     <p:sldId id="297" r:id="rId14"/>
-    <p:sldId id="298" r:id="rId15"/>
+    <p:sldId id="303" r:id="rId15"/>
     <p:sldId id="299" r:id="rId16"/>
     <p:sldId id="300" r:id="rId17"/>
     <p:sldId id="287" r:id="rId18"/>
     <p:sldId id="288" r:id="rId19"/>
-    <p:sldId id="289" r:id="rId20"/>
-    <p:sldId id="290" r:id="rId21"/>
-    <p:sldId id="292" r:id="rId22"/>
-    <p:sldId id="293" r:id="rId23"/>
+    <p:sldId id="298" r:id="rId20"/>
+    <p:sldId id="289" r:id="rId21"/>
+    <p:sldId id="290" r:id="rId22"/>
+    <p:sldId id="292" r:id="rId23"/>
+    <p:sldId id="293" r:id="rId24"/>
   </p:sldIdLst>
   <p:sldSz cx="9144000" cy="5143500" type="screen16x9"/>
   <p:notesSz cx="6858000" cy="9144000"/>
@@ -229,7 +230,7 @@
           <a:p>
             <a:fld id="{B0160BEC-550A-4FF5-8A23-3504083A2721}" type="datetimeFigureOut">
               <a:rPr lang="en-US" smtClean="0"/>
-              <a:t>6/30/21</a:t>
+              <a:t>10/26/21</a:t>
             </a:fld>
             <a:endParaRPr lang="en-US" dirty="0"/>
           </a:p>
@@ -645,7 +646,7 @@
           <a:p>
             <a:fld id="{FF51CD68-44D3-4681-9782-B8CA0706D3C3}" type="slidenum">
               <a:rPr lang="en-US" smtClean="0"/>
-              <a:t>21</a:t>
+              <a:t>22</a:t>
             </a:fld>
             <a:endParaRPr lang="en-US" dirty="0"/>
           </a:p>
@@ -729,7 +730,7 @@
           <a:p>
             <a:fld id="{FF51CD68-44D3-4681-9782-B8CA0706D3C3}" type="slidenum">
               <a:rPr lang="en-US" smtClean="0"/>
-              <a:t>22</a:t>
+              <a:t>23</a:t>
             </a:fld>
             <a:endParaRPr lang="en-US" dirty="0"/>
           </a:p>
@@ -6077,42 +6078,19 @@
           <a:p>
             <a:r>
               <a:rPr lang="en-US" dirty="0"/>
-              <a:t>Limit JVM Heap:</a:t>
-            </a:r>
-          </a:p>
-          <a:p>
-            <a:pPr lvl="1"/>
+              <a:t>3 master nodes &amp; at least 3 data nodes</a:t>
+            </a:r>
+          </a:p>
+          <a:p>
             <a:r>
               <a:rPr lang="en-US" dirty="0"/>
-              <a:t>No more than 26GB</a:t>
-            </a:r>
-          </a:p>
-          <a:p>
-            <a:pPr lvl="1"/>
-            <a:r>
-              <a:rPr lang="en-US" dirty="0"/>
-              <a:t>No more than 50% of available RAM</a:t>
-            </a:r>
-          </a:p>
-          <a:p>
-            <a:r>
-              <a:rPr lang="en-US" dirty="0"/>
-              <a:t>Typical: 8 to 16 cores with 64GB RAM</a:t>
-            </a:r>
-          </a:p>
-          <a:p>
-            <a:r>
-              <a:rPr lang="en-US" dirty="0"/>
-              <a:t>3 master nodes &amp; at least 3 data nodes</a:t>
-            </a:r>
-          </a:p>
-          <a:p>
-            <a:r>
-              <a:rPr lang="en-US" dirty="0"/>
-              <a:t>Master nodes can be small (e.g. 2GB)</a:t>
-            </a:r>
-          </a:p>
-          <a:p>
+              <a:t>Master nodes can be small (e.g. t3a.small)</a:t>
+            </a:r>
+          </a:p>
+          <a:p>
+            <a:pPr marL="0" indent="0">
+              <a:buNone/>
+            </a:pPr>
             <a:endParaRPr lang="en-US" dirty="0"/>
           </a:p>
         </p:txBody>
@@ -6168,7 +6146,7 @@
     </p:spTree>
     <p:extLst>
       <p:ext uri="{BB962C8B-B14F-4D97-AF65-F5344CB8AC3E}">
-        <p14:creationId xmlns:p14="http://schemas.microsoft.com/office/powerpoint/2010/main" val="2530165087"/>
+        <p14:creationId xmlns:p14="http://schemas.microsoft.com/office/powerpoint/2010/main" val="3838471281"/>
       </p:ext>
     </p:extLst>
   </p:cSld>
@@ -6275,39 +6253,26 @@
                                   </p:childTnLst>
                                 </p:cTn>
                               </p:par>
+                            </p:childTnLst>
+                          </p:cTn>
+                        </p:par>
+                      </p:childTnLst>
+                    </p:cTn>
+                  </p:par>
+                  <p:par>
+                    <p:cTn id="11" fill="hold">
+                      <p:stCondLst>
+                        <p:cond delay="indefinite"/>
+                      </p:stCondLst>
+                      <p:childTnLst>
+                        <p:par>
+                          <p:cTn id="12" fill="hold">
+                            <p:stCondLst>
+                              <p:cond delay="0"/>
+                            </p:stCondLst>
+                            <p:childTnLst>
                               <p:par>
-                                <p:cTn id="11" presetID="1" presetClass="entr" presetSubtype="0" fill="hold" grpId="0" nodeType="withEffect">
-                                  <p:stCondLst>
-                                    <p:cond delay="0"/>
-                                  </p:stCondLst>
-                                  <p:childTnLst>
-                                    <p:set>
-                                      <p:cBhvr>
-                                        <p:cTn id="12" dur="1" fill="hold">
-                                          <p:stCondLst>
-                                            <p:cond delay="0"/>
-                                          </p:stCondLst>
-                                        </p:cTn>
-                                        <p:tgtEl>
-                                          <p:spTgt spid="3">
-                                            <p:txEl>
-                                              <p:pRg st="2" end="2"/>
-                                            </p:txEl>
-                                          </p:spTgt>
-                                        </p:tgtEl>
-                                        <p:attrNameLst>
-                                          <p:attrName>style.visibility</p:attrName>
-                                        </p:attrNameLst>
-                                      </p:cBhvr>
-                                      <p:to>
-                                        <p:strVal val="visible"/>
-                                      </p:to>
-                                    </p:set>
-                                  </p:childTnLst>
-                                </p:cTn>
-                              </p:par>
-                              <p:par>
-                                <p:cTn id="13" presetID="1" presetClass="entr" presetSubtype="0" fill="hold" grpId="0" nodeType="withEffect">
+                                <p:cTn id="13" presetID="1" presetClass="entr" presetSubtype="0" fill="hold" grpId="0" nodeType="clickEffect">
                                   <p:stCondLst>
                                     <p:cond delay="0"/>
                                   </p:stCondLst>
@@ -6322,154 +6287,7 @@
                                         <p:tgtEl>
                                           <p:spTgt spid="3">
                                             <p:txEl>
-                                              <p:pRg st="3" end="3"/>
-                                            </p:txEl>
-                                          </p:spTgt>
-                                        </p:tgtEl>
-                                        <p:attrNameLst>
-                                          <p:attrName>style.visibility</p:attrName>
-                                        </p:attrNameLst>
-                                      </p:cBhvr>
-                                      <p:to>
-                                        <p:strVal val="visible"/>
-                                      </p:to>
-                                    </p:set>
-                                  </p:childTnLst>
-                                </p:cTn>
-                              </p:par>
-                            </p:childTnLst>
-                          </p:cTn>
-                        </p:par>
-                      </p:childTnLst>
-                    </p:cTn>
-                  </p:par>
-                  <p:par>
-                    <p:cTn id="15" fill="hold">
-                      <p:stCondLst>
-                        <p:cond delay="indefinite"/>
-                      </p:stCondLst>
-                      <p:childTnLst>
-                        <p:par>
-                          <p:cTn id="16" fill="hold">
-                            <p:stCondLst>
-                              <p:cond delay="0"/>
-                            </p:stCondLst>
-                            <p:childTnLst>
-                              <p:par>
-                                <p:cTn id="17" presetID="1" presetClass="entr" presetSubtype="0" fill="hold" grpId="0" nodeType="clickEffect">
-                                  <p:stCondLst>
-                                    <p:cond delay="0"/>
-                                  </p:stCondLst>
-                                  <p:childTnLst>
-                                    <p:set>
-                                      <p:cBhvr>
-                                        <p:cTn id="18" dur="1" fill="hold">
-                                          <p:stCondLst>
-                                            <p:cond delay="0"/>
-                                          </p:stCondLst>
-                                        </p:cTn>
-                                        <p:tgtEl>
-                                          <p:spTgt spid="3">
-                                            <p:txEl>
-                                              <p:pRg st="4" end="4"/>
-                                            </p:txEl>
-                                          </p:spTgt>
-                                        </p:tgtEl>
-                                        <p:attrNameLst>
-                                          <p:attrName>style.visibility</p:attrName>
-                                        </p:attrNameLst>
-                                      </p:cBhvr>
-                                      <p:to>
-                                        <p:strVal val="visible"/>
-                                      </p:to>
-                                    </p:set>
-                                  </p:childTnLst>
-                                </p:cTn>
-                              </p:par>
-                            </p:childTnLst>
-                          </p:cTn>
-                        </p:par>
-                      </p:childTnLst>
-                    </p:cTn>
-                  </p:par>
-                  <p:par>
-                    <p:cTn id="19" fill="hold">
-                      <p:stCondLst>
-                        <p:cond delay="indefinite"/>
-                      </p:stCondLst>
-                      <p:childTnLst>
-                        <p:par>
-                          <p:cTn id="20" fill="hold">
-                            <p:stCondLst>
-                              <p:cond delay="0"/>
-                            </p:stCondLst>
-                            <p:childTnLst>
-                              <p:par>
-                                <p:cTn id="21" presetID="1" presetClass="entr" presetSubtype="0" fill="hold" grpId="0" nodeType="clickEffect">
-                                  <p:stCondLst>
-                                    <p:cond delay="0"/>
-                                  </p:stCondLst>
-                                  <p:childTnLst>
-                                    <p:set>
-                                      <p:cBhvr>
-                                        <p:cTn id="22" dur="1" fill="hold">
-                                          <p:stCondLst>
-                                            <p:cond delay="0"/>
-                                          </p:stCondLst>
-                                        </p:cTn>
-                                        <p:tgtEl>
-                                          <p:spTgt spid="3">
-                                            <p:txEl>
-                                              <p:pRg st="5" end="5"/>
-                                            </p:txEl>
-                                          </p:spTgt>
-                                        </p:tgtEl>
-                                        <p:attrNameLst>
-                                          <p:attrName>style.visibility</p:attrName>
-                                        </p:attrNameLst>
-                                      </p:cBhvr>
-                                      <p:to>
-                                        <p:strVal val="visible"/>
-                                      </p:to>
-                                    </p:set>
-                                  </p:childTnLst>
-                                </p:cTn>
-                              </p:par>
-                            </p:childTnLst>
-                          </p:cTn>
-                        </p:par>
-                      </p:childTnLst>
-                    </p:cTn>
-                  </p:par>
-                  <p:par>
-                    <p:cTn id="23" fill="hold">
-                      <p:stCondLst>
-                        <p:cond delay="indefinite"/>
-                      </p:stCondLst>
-                      <p:childTnLst>
-                        <p:par>
-                          <p:cTn id="24" fill="hold">
-                            <p:stCondLst>
-                              <p:cond delay="0"/>
-                            </p:stCondLst>
-                            <p:childTnLst>
-                              <p:par>
-                                <p:cTn id="25" presetID="1" presetClass="entr" presetSubtype="0" fill="hold" grpId="0" nodeType="clickEffect">
-                                  <p:stCondLst>
-                                    <p:cond delay="0"/>
-                                  </p:stCondLst>
-                                  <p:childTnLst>
-                                    <p:set>
-                                      <p:cBhvr>
-                                        <p:cTn id="26" dur="1" fill="hold">
-                                          <p:stCondLst>
-                                            <p:cond delay="0"/>
-                                          </p:stCondLst>
-                                        </p:cTn>
-                                        <p:tgtEl>
-                                          <p:spTgt spid="3">
-                                            <p:txEl>
-                                              <p:pRg st="6" end="6"/>
+                                              <p:pRg st="2" end="2"/>
                                             </p:txEl>
                                           </p:spTgt>
                                         </p:tgtEl>
@@ -6601,6 +6419,12 @@
             <a:r>
               <a:rPr lang="en-US" dirty="0"/>
               <a:t>Max of 40GB per shard</a:t>
+            </a:r>
+          </a:p>
+          <a:p>
+            <a:r>
+              <a:rPr lang="en-US" dirty="0"/>
+              <a:t>At least 2 replicas (for redundancy)</a:t>
             </a:r>
           </a:p>
           <a:p>
@@ -6801,6 +6625,55 @@
                                           <p:spTgt spid="3">
                                             <p:txEl>
                                               <p:pRg st="2" end="2"/>
+                                            </p:txEl>
+                                          </p:spTgt>
+                                        </p:tgtEl>
+                                        <p:attrNameLst>
+                                          <p:attrName>style.visibility</p:attrName>
+                                        </p:attrNameLst>
+                                      </p:cBhvr>
+                                      <p:to>
+                                        <p:strVal val="visible"/>
+                                      </p:to>
+                                    </p:set>
+                                  </p:childTnLst>
+                                </p:cTn>
+                              </p:par>
+                            </p:childTnLst>
+                          </p:cTn>
+                        </p:par>
+                      </p:childTnLst>
+                    </p:cTn>
+                  </p:par>
+                  <p:par>
+                    <p:cTn id="15" fill="hold">
+                      <p:stCondLst>
+                        <p:cond delay="indefinite"/>
+                      </p:stCondLst>
+                      <p:childTnLst>
+                        <p:par>
+                          <p:cTn id="16" fill="hold">
+                            <p:stCondLst>
+                              <p:cond delay="0"/>
+                            </p:stCondLst>
+                            <p:childTnLst>
+                              <p:par>
+                                <p:cTn id="17" presetID="1" presetClass="entr" presetSubtype="0" fill="hold" grpId="0" nodeType="clickEffect">
+                                  <p:stCondLst>
+                                    <p:cond delay="0"/>
+                                  </p:stCondLst>
+                                  <p:childTnLst>
+                                    <p:set>
+                                      <p:cBhvr>
+                                        <p:cTn id="18" dur="1" fill="hold">
+                                          <p:stCondLst>
+                                            <p:cond delay="0"/>
+                                          </p:stCondLst>
+                                        </p:cTn>
+                                        <p:tgtEl>
+                                          <p:spTgt spid="3">
+                                            <p:txEl>
+                                              <p:pRg st="3" end="3"/>
                                             </p:txEl>
                                           </p:spTgt>
                                         </p:tgtEl>
@@ -7276,7 +7149,7 @@
           <a:p>
             <a:r>
               <a:rPr lang="en-US" dirty="0"/>
-              <a:t>Important Configuration Settings</a:t>
+              <a:t>If you are managing your own cluster…</a:t>
             </a:r>
           </a:p>
         </p:txBody>
@@ -7376,8 +7249,13 @@
           <a:p>
             <a:r>
               <a:rPr lang="en-US" dirty="0"/>
-              <a:t>Stuff you really need to set in production</a:t>
-            </a:r>
+              <a:t>Stuff you need to set if managing your </a:t>
+            </a:r>
+            <a:r>
+              <a:rPr lang="en-US"/>
+              <a:t>own cluster</a:t>
+            </a:r>
+            <a:endParaRPr lang="en-US" dirty="0"/>
           </a:p>
         </p:txBody>
       </p:sp>
@@ -7871,20 +7749,83 @@
           <a:bodyPr/>
           <a:lstStyle/>
           <a:p>
-            <a:pPr algn="ctr"/>
             <a:r>
               <a:rPr lang="en-US" dirty="0"/>
-              <a:t>X-Pack</a:t>
-            </a:r>
-          </a:p>
-        </p:txBody>
-      </p:sp>
-      <p:sp>
-        <p:nvSpPr>
-          <p:cNvPr id="3" name="TextBox 2">
+              <a:t>Sizing your cluster</a:t>
+            </a:r>
+          </a:p>
+        </p:txBody>
+      </p:sp>
+      <p:sp>
+        <p:nvSpPr>
+          <p:cNvPr id="3" name="Content Placeholder 2"/>
+          <p:cNvSpPr>
+            <a:spLocks noGrp="1"/>
+          </p:cNvSpPr>
+          <p:nvPr>
+            <p:ph idx="1"/>
+          </p:nvPr>
+        </p:nvSpPr>
+        <p:spPr>
+          <a:xfrm>
+            <a:off x="457200" y="819150"/>
+            <a:ext cx="8229600" cy="4038600"/>
+          </a:xfrm>
+        </p:spPr>
+        <p:txBody>
+          <a:bodyPr>
+            <a:normAutofit/>
+          </a:bodyPr>
+          <a:lstStyle/>
+          <a:p>
+            <a:pPr marL="0" indent="0">
+              <a:buNone/>
+            </a:pPr>
+            <a:r>
+              <a:rPr lang="en-US" dirty="0"/>
+              <a:t>Recommendations:</a:t>
+            </a:r>
+          </a:p>
+          <a:p>
+            <a:r>
+              <a:rPr lang="en-US" dirty="0"/>
+              <a:t>Limit JVM Heap:</a:t>
+            </a:r>
+          </a:p>
+          <a:p>
+            <a:pPr lvl="1"/>
+            <a:r>
+              <a:rPr lang="en-US" dirty="0"/>
+              <a:t>No more than 26GB</a:t>
+            </a:r>
+          </a:p>
+          <a:p>
+            <a:pPr lvl="1"/>
+            <a:r>
+              <a:rPr lang="en-US" dirty="0"/>
+              <a:t>No more than 50% of available RAM</a:t>
+            </a:r>
+          </a:p>
+          <a:p>
+            <a:r>
+              <a:rPr lang="en-US" dirty="0"/>
+              <a:t>Typical: 8 to 16 cores with 64GB RAM</a:t>
+            </a:r>
+          </a:p>
+          <a:p>
+            <a:pPr marL="0" indent="0">
+              <a:buNone/>
+            </a:pPr>
+            <a:endParaRPr lang="en-US" dirty="0"/>
+          </a:p>
+        </p:txBody>
+      </p:sp>
+      <p:sp>
+        <p:nvSpPr>
+          <p:cNvPr id="4" name="TextBox 3">
             <a:extLst>
               <a:ext uri="{FF2B5EF4-FFF2-40B4-BE49-F238E27FC236}">
-                <a16:creationId xmlns:a16="http://schemas.microsoft.com/office/drawing/2014/main" id="{7ABB4871-1625-1C44-A992-A98B42E57EBC}"/>
+                <a16:creationId xmlns:a16="http://schemas.microsoft.com/office/drawing/2014/main" id="{2F06FA5D-F37F-834C-B309-3957287EA547}"/>
               </a:ext>
             </a:extLst>
           </p:cNvPr>
@@ -7911,7 +7852,7 @@
               <a:rPr lang="en-AU" sz="1200" dirty="0">
                 <a:solidFill>
                   <a:schemeClr val="bg1">
-                    <a:lumMod val="50000"/>
+                    <a:lumMod val="75000"/>
                   </a:schemeClr>
                 </a:solidFill>
               </a:rPr>
@@ -7920,7 +7861,7 @@
             <a:endParaRPr lang="en-US" sz="1200" dirty="0">
               <a:solidFill>
                 <a:schemeClr val="bg1">
-                  <a:lumMod val="50000"/>
+                  <a:lumMod val="75000"/>
                 </a:schemeClr>
               </a:solidFill>
             </a:endParaRPr>
@@ -7930,13 +7871,255 @@
     </p:spTree>
     <p:extLst>
       <p:ext uri="{BB962C8B-B14F-4D97-AF65-F5344CB8AC3E}">
-        <p14:creationId xmlns:p14="http://schemas.microsoft.com/office/powerpoint/2010/main" val="1895056977"/>
+        <p14:creationId xmlns:p14="http://schemas.microsoft.com/office/powerpoint/2010/main" val="2530165087"/>
       </p:ext>
     </p:extLst>
   </p:cSld>
   <p:clrMapOvr>
     <a:masterClrMapping/>
   </p:clrMapOvr>
+  <p:timing>
+    <p:tnLst>
+      <p:par>
+        <p:cTn id="1" dur="indefinite" restart="never" nodeType="tmRoot">
+          <p:childTnLst>
+            <p:seq concurrent="1" nextAc="seek">
+              <p:cTn id="2" dur="indefinite" nodeType="mainSeq">
+                <p:childTnLst>
+                  <p:par>
+                    <p:cTn id="3" fill="hold">
+                      <p:stCondLst>
+                        <p:cond delay="indefinite"/>
+                      </p:stCondLst>
+                      <p:childTnLst>
+                        <p:par>
+                          <p:cTn id="4" fill="hold">
+                            <p:stCondLst>
+                              <p:cond delay="0"/>
+                            </p:stCondLst>
+                            <p:childTnLst>
+                              <p:par>
+                                <p:cTn id="5" presetID="1" presetClass="entr" presetSubtype="0" fill="hold" grpId="0" nodeType="clickEffect">
+                                  <p:stCondLst>
+                                    <p:cond delay="0"/>
+                                  </p:stCondLst>
+                                  <p:childTnLst>
+                                    <p:set>
+                                      <p:cBhvr>
+                                        <p:cTn id="6" dur="1" fill="hold">
+                                          <p:stCondLst>
+                                            <p:cond delay="0"/>
+                                          </p:stCondLst>
+                                        </p:cTn>
+                                        <p:tgtEl>
+                                          <p:spTgt spid="3">
+                                            <p:txEl>
+                                              <p:pRg st="0" end="0"/>
+                                            </p:txEl>
+                                          </p:spTgt>
+                                        </p:tgtEl>
+                                        <p:attrNameLst>
+                                          <p:attrName>style.visibility</p:attrName>
+                                        </p:attrNameLst>
+                                      </p:cBhvr>
+                                      <p:to>
+                                        <p:strVal val="visible"/>
+                                      </p:to>
+                                    </p:set>
+                                  </p:childTnLst>
+                                </p:cTn>
+                              </p:par>
+                            </p:childTnLst>
+                          </p:cTn>
+                        </p:par>
+                      </p:childTnLst>
+                    </p:cTn>
+                  </p:par>
+                  <p:par>
+                    <p:cTn id="7" fill="hold">
+                      <p:stCondLst>
+                        <p:cond delay="indefinite"/>
+                      </p:stCondLst>
+                      <p:childTnLst>
+                        <p:par>
+                          <p:cTn id="8" fill="hold">
+                            <p:stCondLst>
+                              <p:cond delay="0"/>
+                            </p:stCondLst>
+                            <p:childTnLst>
+                              <p:par>
+                                <p:cTn id="9" presetID="1" presetClass="entr" presetSubtype="0" fill="hold" grpId="0" nodeType="clickEffect">
+                                  <p:stCondLst>
+                                    <p:cond delay="0"/>
+                                  </p:stCondLst>
+                                  <p:childTnLst>
+                                    <p:set>
+                                      <p:cBhvr>
+                                        <p:cTn id="10" dur="1" fill="hold">
+                                          <p:stCondLst>
+                                            <p:cond delay="0"/>
+                                          </p:stCondLst>
+                                        </p:cTn>
+                                        <p:tgtEl>
+                                          <p:spTgt spid="3">
+                                            <p:txEl>
+                                              <p:pRg st="1" end="1"/>
+                                            </p:txEl>
+                                          </p:spTgt>
+                                        </p:tgtEl>
+                                        <p:attrNameLst>
+                                          <p:attrName>style.visibility</p:attrName>
+                                        </p:attrNameLst>
+                                      </p:cBhvr>
+                                      <p:to>
+                                        <p:strVal val="visible"/>
+                                      </p:to>
+                                    </p:set>
+                                  </p:childTnLst>
+                                </p:cTn>
+                              </p:par>
+                              <p:par>
+                                <p:cTn id="11" presetID="1" presetClass="entr" presetSubtype="0" fill="hold" grpId="0" nodeType="withEffect">
+                                  <p:stCondLst>
+                                    <p:cond delay="0"/>
+                                  </p:stCondLst>
+                                  <p:childTnLst>
+                                    <p:set>
+                                      <p:cBhvr>
+                                        <p:cTn id="12" dur="1" fill="hold">
+                                          <p:stCondLst>
+                                            <p:cond delay="0"/>
+                                          </p:stCondLst>
+                                        </p:cTn>
+                                        <p:tgtEl>
+                                          <p:spTgt spid="3">
+                                            <p:txEl>
+                                              <p:pRg st="2" end="2"/>
+                                            </p:txEl>
+                                          </p:spTgt>
+                                        </p:tgtEl>
+                                        <p:attrNameLst>
+                                          <p:attrName>style.visibility</p:attrName>
+                                        </p:attrNameLst>
+                                      </p:cBhvr>
+                                      <p:to>
+                                        <p:strVal val="visible"/>
+                                      </p:to>
+                                    </p:set>
+                                  </p:childTnLst>
+                                </p:cTn>
+                              </p:par>
+                              <p:par>
+                                <p:cTn id="13" presetID="1" presetClass="entr" presetSubtype="0" fill="hold" grpId="0" nodeType="withEffect">
+                                  <p:stCondLst>
+                                    <p:cond delay="0"/>
+                                  </p:stCondLst>
+                                  <p:childTnLst>
+                                    <p:set>
+                                      <p:cBhvr>
+                                        <p:cTn id="14" dur="1" fill="hold">
+                                          <p:stCondLst>
+                                            <p:cond delay="0"/>
+                                          </p:stCondLst>
+                                        </p:cTn>
+                                        <p:tgtEl>
+                                          <p:spTgt spid="3">
+                                            <p:txEl>
+                                              <p:pRg st="3" end="3"/>
+                                            </p:txEl>
+                                          </p:spTgt>
+                                        </p:tgtEl>
+                                        <p:attrNameLst>
+                                          <p:attrName>style.visibility</p:attrName>
+                                        </p:attrNameLst>
+                                      </p:cBhvr>
+                                      <p:to>
+                                        <p:strVal val="visible"/>
+                                      </p:to>
+                                    </p:set>
+                                  </p:childTnLst>
+                                </p:cTn>
+                              </p:par>
+                            </p:childTnLst>
+                          </p:cTn>
+                        </p:par>
+                      </p:childTnLst>
+                    </p:cTn>
+                  </p:par>
+                  <p:par>
+                    <p:cTn id="15" fill="hold">
+                      <p:stCondLst>
+                        <p:cond delay="indefinite"/>
+                      </p:stCondLst>
+                      <p:childTnLst>
+                        <p:par>
+                          <p:cTn id="16" fill="hold">
+                            <p:stCondLst>
+                              <p:cond delay="0"/>
+                            </p:stCondLst>
+                            <p:childTnLst>
+                              <p:par>
+                                <p:cTn id="17" presetID="1" presetClass="entr" presetSubtype="0" fill="hold" grpId="0" nodeType="clickEffect">
+                                  <p:stCondLst>
+                                    <p:cond delay="0"/>
+                                  </p:stCondLst>
+                                  <p:childTnLst>
+                                    <p:set>
+                                      <p:cBhvr>
+                                        <p:cTn id="18" dur="1" fill="hold">
+                                          <p:stCondLst>
+                                            <p:cond delay="0"/>
+                                          </p:stCondLst>
+                                        </p:cTn>
+                                        <p:tgtEl>
+                                          <p:spTgt spid="3">
+                                            <p:txEl>
+                                              <p:pRg st="4" end="4"/>
+                                            </p:txEl>
+                                          </p:spTgt>
+                                        </p:tgtEl>
+                                        <p:attrNameLst>
+                                          <p:attrName>style.visibility</p:attrName>
+                                        </p:attrNameLst>
+                                      </p:cBhvr>
+                                      <p:to>
+                                        <p:strVal val="visible"/>
+                                      </p:to>
+                                    </p:set>
+                                  </p:childTnLst>
+                                </p:cTn>
+                              </p:par>
+                            </p:childTnLst>
+                          </p:cTn>
+                        </p:par>
+                      </p:childTnLst>
+                    </p:cTn>
+                  </p:par>
+                </p:childTnLst>
+              </p:cTn>
+              <p:prevCondLst>
+                <p:cond evt="onPrev" delay="0">
+                  <p:tgtEl>
+                    <p:sldTgt/>
+                  </p:tgtEl>
+                </p:cond>
+              </p:prevCondLst>
+              <p:nextCondLst>
+                <p:cond evt="onNext" delay="0">
+                  <p:tgtEl>
+                    <p:sldTgt/>
+                  </p:tgtEl>
+                </p:cond>
+              </p:nextCondLst>
+            </p:seq>
+          </p:childTnLst>
+        </p:cTn>
+      </p:par>
+    </p:tnLst>
+    <p:bldLst>
+      <p:bldP spid="3" grpId="0" build="p"/>
+    </p:bldLst>
+  </p:timing>
 </p:sld>
 </file>
 
@@ -8029,6 +8212,107 @@
 </file>
 
 <file path=ppt/slides/slide20.xml><?xml version="1.0" encoding="utf-8"?>
+<p:sld xmlns:a="http://schemas.openxmlformats.org/drawingml/2006/main" xmlns:r="http://schemas.openxmlformats.org/officeDocument/2006/relationships" xmlns:p="http://schemas.openxmlformats.org/presentationml/2006/main">
+  <p:cSld>
+    <p:spTree>
+      <p:nvGrpSpPr>
+        <p:cNvPr id="1" name=""/>
+        <p:cNvGrpSpPr/>
+        <p:nvPr/>
+      </p:nvGrpSpPr>
+      <p:grpSpPr>
+        <a:xfrm>
+          <a:off x="0" y="0"/>
+          <a:ext cx="0" cy="0"/>
+          <a:chOff x="0" y="0"/>
+          <a:chExt cx="0" cy="0"/>
+        </a:xfrm>
+      </p:grpSpPr>
+      <p:sp>
+        <p:nvSpPr>
+          <p:cNvPr id="2" name="Title 1"/>
+          <p:cNvSpPr>
+            <a:spLocks noGrp="1"/>
+          </p:cNvSpPr>
+          <p:nvPr>
+            <p:ph type="title"/>
+          </p:nvPr>
+        </p:nvSpPr>
+        <p:spPr/>
+        <p:txBody>
+          <a:bodyPr/>
+          <a:lstStyle/>
+          <a:p>
+            <a:pPr algn="ctr"/>
+            <a:r>
+              <a:rPr lang="en-US" dirty="0"/>
+              <a:t>X-Pack</a:t>
+            </a:r>
+          </a:p>
+        </p:txBody>
+      </p:sp>
+      <p:sp>
+        <p:nvSpPr>
+          <p:cNvPr id="3" name="TextBox 2">
+            <a:extLst>
+              <a:ext uri="{FF2B5EF4-FFF2-40B4-BE49-F238E27FC236}">
+                <a16:creationId xmlns:a16="http://schemas.microsoft.com/office/drawing/2014/main" id="{7ABB4871-1625-1C44-A992-A98B42E57EBC}"/>
+              </a:ext>
+            </a:extLst>
+          </p:cNvPr>
+          <p:cNvSpPr txBox="1"/>
+          <p:nvPr/>
+        </p:nvSpPr>
+        <p:spPr>
+          <a:xfrm>
+            <a:off x="6873871" y="4705350"/>
+            <a:ext cx="2101857" cy="276999"/>
+          </a:xfrm>
+          <a:prstGeom prst="rect">
+            <a:avLst/>
+          </a:prstGeom>
+          <a:noFill/>
+        </p:spPr>
+        <p:txBody>
+          <a:bodyPr wrap="none" rtlCol="0">
+            <a:spAutoFit/>
+          </a:bodyPr>
+          <a:lstStyle/>
+          <a:p>
+            <a:r>
+              <a:rPr lang="en-AU" sz="1200" dirty="0">
+                <a:solidFill>
+                  <a:schemeClr val="bg1">
+                    <a:lumMod val="50000"/>
+                  </a:schemeClr>
+                </a:solidFill>
+              </a:rPr>
+              <a:t>© copyright REA Group Ltd</a:t>
+            </a:r>
+            <a:endParaRPr lang="en-US" sz="1200" dirty="0">
+              <a:solidFill>
+                <a:schemeClr val="bg1">
+                  <a:lumMod val="50000"/>
+                </a:schemeClr>
+              </a:solidFill>
+            </a:endParaRPr>
+          </a:p>
+        </p:txBody>
+      </p:sp>
+    </p:spTree>
+    <p:extLst>
+      <p:ext uri="{BB962C8B-B14F-4D97-AF65-F5344CB8AC3E}">
+        <p14:creationId xmlns:p14="http://schemas.microsoft.com/office/powerpoint/2010/main" val="1895056977"/>
+      </p:ext>
+    </p:extLst>
+  </p:cSld>
+  <p:clrMapOvr>
+    <a:masterClrMapping/>
+  </p:clrMapOvr>
+</p:sld>
+</file>
+
+<file path=ppt/slides/slide21.xml><?xml version="1.0" encoding="utf-8"?>
 <p:sld xmlns:a="http://schemas.openxmlformats.org/drawingml/2006/main" xmlns:r="http://schemas.openxmlformats.org/officeDocument/2006/relationships" xmlns:p="http://schemas.openxmlformats.org/presentationml/2006/main">
   <p:cSld>
     <p:spTree>
@@ -8512,7 +8796,7 @@
 </p:sld>
 </file>
 
-<file path=ppt/slides/slide21.xml><?xml version="1.0" encoding="utf-8"?>
+<file path=ppt/slides/slide22.xml><?xml version="1.0" encoding="utf-8"?>
 <p:sld xmlns:a="http://schemas.openxmlformats.org/drawingml/2006/main" xmlns:r="http://schemas.openxmlformats.org/officeDocument/2006/relationships" xmlns:p="http://schemas.openxmlformats.org/presentationml/2006/main">
   <p:cSld>
     <p:spTree>
@@ -9391,7 +9675,7 @@
 </p:sld>
 </file>
 
-<file path=ppt/slides/slide22.xml><?xml version="1.0" encoding="utf-8"?>
+<file path=ppt/slides/slide23.xml><?xml version="1.0" encoding="utf-8"?>
 <p:sld xmlns:a="http://schemas.openxmlformats.org/drawingml/2006/main" xmlns:r="http://schemas.openxmlformats.org/officeDocument/2006/relationships" xmlns:p="http://schemas.openxmlformats.org/presentationml/2006/main">
   <p:cSld>
     <p:spTree>

</xml_diff>